<commit_message>
Added some more media/design stuff
</commit_message>
<xml_diff>
--- a/smarts/trunk/media/presentations/progress_report/progress_report.pptx
+++ b/smarts/trunk/media/presentations/progress_report/progress_report.pptx
@@ -23,16 +23,24 @@
     <p:sldId id="280" r:id="rId17"/>
     <p:sldId id="293" r:id="rId18"/>
     <p:sldId id="282" r:id="rId19"/>
-    <p:sldId id="285" r:id="rId20"/>
-    <p:sldId id="286" r:id="rId21"/>
-    <p:sldId id="287" r:id="rId22"/>
-    <p:sldId id="288" r:id="rId23"/>
-    <p:sldId id="289" r:id="rId24"/>
-    <p:sldId id="290" r:id="rId25"/>
-    <p:sldId id="291" r:id="rId26"/>
-    <p:sldId id="283" r:id="rId27"/>
-    <p:sldId id="292" r:id="rId28"/>
-    <p:sldId id="284" r:id="rId29"/>
+    <p:sldId id="286" r:id="rId20"/>
+    <p:sldId id="285" r:id="rId21"/>
+    <p:sldId id="300" r:id="rId22"/>
+    <p:sldId id="301" r:id="rId23"/>
+    <p:sldId id="303" r:id="rId24"/>
+    <p:sldId id="287" r:id="rId25"/>
+    <p:sldId id="288" r:id="rId26"/>
+    <p:sldId id="289" r:id="rId27"/>
+    <p:sldId id="290" r:id="rId28"/>
+    <p:sldId id="291" r:id="rId29"/>
+    <p:sldId id="283" r:id="rId30"/>
+    <p:sldId id="297" r:id="rId31"/>
+    <p:sldId id="295" r:id="rId32"/>
+    <p:sldId id="299" r:id="rId33"/>
+    <p:sldId id="298" r:id="rId34"/>
+    <p:sldId id="294" r:id="rId35"/>
+    <p:sldId id="292" r:id="rId36"/>
+    <p:sldId id="284" r:id="rId37"/>
   </p:sldIdLst>
   <p:sldSz cx="12192000" cy="6858000"/>
   <p:notesSz cx="6858000" cy="9144000"/>
@@ -641,7 +649,7 @@
           <a:p>
             <a:fld id="{191783DA-712F-492F-97F7-2286DA2B7FF6}" type="datetimeFigureOut">
               <a:rPr lang="en-US" smtClean="0"/>
-              <a:t>12/6/2014</a:t>
+              <a:t>12/12/2014</a:t>
             </a:fld>
             <a:endParaRPr lang="en-US"/>
           </a:p>
@@ -704,14 +712,14 @@
   <p:clrMapOvr>
     <a:masterClrMapping/>
   </p:clrMapOvr>
-  <mc:AlternateContent xmlns:mc="http://schemas.openxmlformats.org/markup-compatibility/2006" xmlns:p14="http://schemas.microsoft.com/office/powerpoint/2010/main">
-    <mc:Choice Requires="p14">
-      <p:transition spd="slow" p14:dur="800">
-        <p14:flythrough/>
+  <mc:AlternateContent xmlns:mc="http://schemas.openxmlformats.org/markup-compatibility/2006">
+    <mc:Choice xmlns:p14="http://schemas.microsoft.com/office/powerpoint/2010/main" Requires="p14">
+      <p:transition p14:dur="400">
+        <p:fade/>
       </p:transition>
     </mc:Choice>
-    <mc:Fallback xmlns="">
-      <p:transition spd="slow">
+    <mc:Fallback>
+      <p:transition>
         <p:fade/>
       </p:transition>
     </mc:Fallback>
@@ -949,7 +957,7 @@
           <a:p>
             <a:fld id="{191783DA-712F-492F-97F7-2286DA2B7FF6}" type="datetimeFigureOut">
               <a:rPr lang="en-US" smtClean="0"/>
-              <a:t>12/6/2014</a:t>
+              <a:t>12/12/2014</a:t>
             </a:fld>
             <a:endParaRPr lang="en-US"/>
           </a:p>
@@ -1007,14 +1015,14 @@
   <p:clrMapOvr>
     <a:masterClrMapping/>
   </p:clrMapOvr>
-  <mc:AlternateContent xmlns:mc="http://schemas.openxmlformats.org/markup-compatibility/2006" xmlns:p14="http://schemas.microsoft.com/office/powerpoint/2010/main">
-    <mc:Choice Requires="p14">
-      <p:transition spd="slow" p14:dur="800">
-        <p14:flythrough/>
+  <mc:AlternateContent xmlns:mc="http://schemas.openxmlformats.org/markup-compatibility/2006">
+    <mc:Choice xmlns:p14="http://schemas.microsoft.com/office/powerpoint/2010/main" Requires="p14">
+      <p:transition p14:dur="400">
+        <p:fade/>
       </p:transition>
     </mc:Choice>
-    <mc:Fallback xmlns="">
-      <p:transition spd="slow">
+    <mc:Fallback>
+      <p:transition>
         <p:fade/>
       </p:transition>
     </mc:Fallback>
@@ -1209,7 +1217,7 @@
           <a:p>
             <a:fld id="{191783DA-712F-492F-97F7-2286DA2B7FF6}" type="datetimeFigureOut">
               <a:rPr lang="en-US" smtClean="0"/>
-              <a:t>12/6/2014</a:t>
+              <a:t>12/12/2014</a:t>
             </a:fld>
             <a:endParaRPr lang="en-US"/>
           </a:p>
@@ -1267,14 +1275,14 @@
   <p:clrMapOvr>
     <a:masterClrMapping/>
   </p:clrMapOvr>
-  <mc:AlternateContent xmlns:mc="http://schemas.openxmlformats.org/markup-compatibility/2006" xmlns:p14="http://schemas.microsoft.com/office/powerpoint/2010/main">
-    <mc:Choice Requires="p14">
-      <p:transition spd="slow" p14:dur="800">
-        <p14:flythrough/>
+  <mc:AlternateContent xmlns:mc="http://schemas.openxmlformats.org/markup-compatibility/2006">
+    <mc:Choice xmlns:p14="http://schemas.microsoft.com/office/powerpoint/2010/main" Requires="p14">
+      <p:transition p14:dur="400">
+        <p:fade/>
       </p:transition>
     </mc:Choice>
-    <mc:Fallback xmlns="">
-      <p:transition spd="slow">
+    <mc:Fallback>
+      <p:transition>
         <p:fade/>
       </p:transition>
     </mc:Fallback>
@@ -1761,7 +1769,7 @@
           <a:p>
             <a:fld id="{191783DA-712F-492F-97F7-2286DA2B7FF6}" type="datetimeFigureOut">
               <a:rPr lang="en-US" smtClean="0"/>
-              <a:t>12/6/2014</a:t>
+              <a:t>12/12/2014</a:t>
             </a:fld>
             <a:endParaRPr lang="en-US"/>
           </a:p>
@@ -1819,14 +1827,14 @@
   <p:clrMapOvr>
     <a:masterClrMapping/>
   </p:clrMapOvr>
-  <mc:AlternateContent xmlns:mc="http://schemas.openxmlformats.org/markup-compatibility/2006" xmlns:p14="http://schemas.microsoft.com/office/powerpoint/2010/main">
-    <mc:Choice Requires="p14">
-      <p:transition spd="slow" p14:dur="800">
-        <p14:flythrough/>
+  <mc:AlternateContent xmlns:mc="http://schemas.openxmlformats.org/markup-compatibility/2006">
+    <mc:Choice xmlns:p14="http://schemas.microsoft.com/office/powerpoint/2010/main" Requires="p14">
+      <p:transition p14:dur="400">
+        <p:fade/>
       </p:transition>
     </mc:Choice>
-    <mc:Fallback xmlns="">
-      <p:transition spd="slow">
+    <mc:Fallback>
+      <p:transition>
         <p:fade/>
       </p:transition>
     </mc:Fallback>
@@ -2021,7 +2029,7 @@
           <a:p>
             <a:fld id="{191783DA-712F-492F-97F7-2286DA2B7FF6}" type="datetimeFigureOut">
               <a:rPr lang="en-US" smtClean="0"/>
-              <a:t>12/6/2014</a:t>
+              <a:t>12/12/2014</a:t>
             </a:fld>
             <a:endParaRPr lang="en-US"/>
           </a:p>
@@ -2079,14 +2087,14 @@
   <p:clrMapOvr>
     <a:masterClrMapping/>
   </p:clrMapOvr>
-  <mc:AlternateContent xmlns:mc="http://schemas.openxmlformats.org/markup-compatibility/2006" xmlns:p14="http://schemas.microsoft.com/office/powerpoint/2010/main">
-    <mc:Choice Requires="p14">
-      <p:transition spd="slow" p14:dur="800">
-        <p14:flythrough/>
+  <mc:AlternateContent xmlns:mc="http://schemas.openxmlformats.org/markup-compatibility/2006">
+    <mc:Choice xmlns:p14="http://schemas.microsoft.com/office/powerpoint/2010/main" Requires="p14">
+      <p:transition p14:dur="400">
+        <p:fade/>
       </p:transition>
     </mc:Choice>
-    <mc:Fallback xmlns="">
-      <p:transition spd="slow">
+    <mc:Fallback>
+      <p:transition>
         <p:fade/>
       </p:transition>
     </mc:Fallback>
@@ -2565,7 +2573,7 @@
           <a:p>
             <a:fld id="{191783DA-712F-492F-97F7-2286DA2B7FF6}" type="datetimeFigureOut">
               <a:rPr lang="en-US" smtClean="0"/>
-              <a:t>12/6/2014</a:t>
+              <a:t>12/12/2014</a:t>
             </a:fld>
             <a:endParaRPr lang="en-US"/>
           </a:p>
@@ -2623,14 +2631,14 @@
   <p:clrMapOvr>
     <a:masterClrMapping/>
   </p:clrMapOvr>
-  <mc:AlternateContent xmlns:mc="http://schemas.openxmlformats.org/markup-compatibility/2006" xmlns:p14="http://schemas.microsoft.com/office/powerpoint/2010/main">
-    <mc:Choice Requires="p14">
-      <p:transition spd="slow" p14:dur="800">
-        <p14:flythrough/>
+  <mc:AlternateContent xmlns:mc="http://schemas.openxmlformats.org/markup-compatibility/2006">
+    <mc:Choice xmlns:p14="http://schemas.microsoft.com/office/powerpoint/2010/main" Requires="p14">
+      <p:transition p14:dur="400">
+        <p:fade/>
       </p:transition>
     </mc:Choice>
-    <mc:Fallback xmlns="">
-      <p:transition spd="slow">
+    <mc:Fallback>
+      <p:transition>
         <p:fade/>
       </p:transition>
     </mc:Fallback>
@@ -2874,7 +2882,7 @@
           <a:p>
             <a:fld id="{191783DA-712F-492F-97F7-2286DA2B7FF6}" type="datetimeFigureOut">
               <a:rPr lang="en-US" smtClean="0"/>
-              <a:t>12/6/2014</a:t>
+              <a:t>12/12/2014</a:t>
             </a:fld>
             <a:endParaRPr lang="en-US"/>
           </a:p>
@@ -2932,14 +2940,14 @@
   <p:clrMapOvr>
     <a:masterClrMapping/>
   </p:clrMapOvr>
-  <mc:AlternateContent xmlns:mc="http://schemas.openxmlformats.org/markup-compatibility/2006" xmlns:p14="http://schemas.microsoft.com/office/powerpoint/2010/main">
-    <mc:Choice Requires="p14">
-      <p:transition spd="slow" p14:dur="800">
-        <p14:flythrough/>
+  <mc:AlternateContent xmlns:mc="http://schemas.openxmlformats.org/markup-compatibility/2006">
+    <mc:Choice xmlns:p14="http://schemas.microsoft.com/office/powerpoint/2010/main" Requires="p14">
+      <p:transition p14:dur="400">
+        <p:fade/>
       </p:transition>
     </mc:Choice>
-    <mc:Fallback xmlns="">
-      <p:transition spd="slow">
+    <mc:Fallback>
+      <p:transition>
         <p:fade/>
       </p:transition>
     </mc:Fallback>
@@ -3060,7 +3068,7 @@
           <a:p>
             <a:fld id="{191783DA-712F-492F-97F7-2286DA2B7FF6}" type="datetimeFigureOut">
               <a:rPr lang="en-US" smtClean="0"/>
-              <a:t>12/6/2014</a:t>
+              <a:t>12/12/2014</a:t>
             </a:fld>
             <a:endParaRPr lang="en-US"/>
           </a:p>
@@ -3118,14 +3126,14 @@
   <p:clrMapOvr>
     <a:masterClrMapping/>
   </p:clrMapOvr>
-  <mc:AlternateContent xmlns:mc="http://schemas.openxmlformats.org/markup-compatibility/2006" xmlns:p14="http://schemas.microsoft.com/office/powerpoint/2010/main">
-    <mc:Choice Requires="p14">
-      <p:transition spd="slow" p14:dur="800">
-        <p14:flythrough/>
+  <mc:AlternateContent xmlns:mc="http://schemas.openxmlformats.org/markup-compatibility/2006">
+    <mc:Choice xmlns:p14="http://schemas.microsoft.com/office/powerpoint/2010/main" Requires="p14">
+      <p:transition p14:dur="400">
+        <p:fade/>
       </p:transition>
     </mc:Choice>
-    <mc:Fallback xmlns="">
-      <p:transition spd="slow">
+    <mc:Fallback>
+      <p:transition>
         <p:fade/>
       </p:transition>
     </mc:Fallback>
@@ -3252,7 +3260,7 @@
           <a:p>
             <a:fld id="{191783DA-712F-492F-97F7-2286DA2B7FF6}" type="datetimeFigureOut">
               <a:rPr lang="en-US" smtClean="0"/>
-              <a:t>12/6/2014</a:t>
+              <a:t>12/12/2014</a:t>
             </a:fld>
             <a:endParaRPr lang="en-US"/>
           </a:p>
@@ -3310,14 +3318,14 @@
   <p:clrMapOvr>
     <a:masterClrMapping/>
   </p:clrMapOvr>
-  <mc:AlternateContent xmlns:mc="http://schemas.openxmlformats.org/markup-compatibility/2006" xmlns:p14="http://schemas.microsoft.com/office/powerpoint/2010/main">
-    <mc:Choice Requires="p14">
-      <p:transition spd="slow" p14:dur="800">
-        <p14:flythrough/>
+  <mc:AlternateContent xmlns:mc="http://schemas.openxmlformats.org/markup-compatibility/2006">
+    <mc:Choice xmlns:p14="http://schemas.microsoft.com/office/powerpoint/2010/main" Requires="p14">
+      <p:transition p14:dur="400">
+        <p:fade/>
       </p:transition>
     </mc:Choice>
-    <mc:Fallback xmlns="">
-      <p:transition spd="slow">
+    <mc:Fallback>
+      <p:transition>
         <p:fade/>
       </p:transition>
     </mc:Fallback>
@@ -3434,7 +3442,7 @@
           <a:p>
             <a:fld id="{191783DA-712F-492F-97F7-2286DA2B7FF6}" type="datetimeFigureOut">
               <a:rPr lang="en-US" smtClean="0"/>
-              <a:t>12/6/2014</a:t>
+              <a:t>12/12/2014</a:t>
             </a:fld>
             <a:endParaRPr lang="en-US"/>
           </a:p>
@@ -3497,14 +3505,14 @@
   <p:clrMapOvr>
     <a:masterClrMapping/>
   </p:clrMapOvr>
-  <mc:AlternateContent xmlns:mc="http://schemas.openxmlformats.org/markup-compatibility/2006" xmlns:p14="http://schemas.microsoft.com/office/powerpoint/2010/main">
-    <mc:Choice Requires="p14">
-      <p:transition spd="slow" p14:dur="800">
-        <p14:flythrough/>
+  <mc:AlternateContent xmlns:mc="http://schemas.openxmlformats.org/markup-compatibility/2006">
+    <mc:Choice xmlns:p14="http://schemas.microsoft.com/office/powerpoint/2010/main" Requires="p14">
+      <p:transition p14:dur="400">
+        <p:fade/>
       </p:transition>
     </mc:Choice>
-    <mc:Fallback xmlns="">
-      <p:transition spd="slow">
+    <mc:Fallback>
+      <p:transition>
         <p:fade/>
       </p:transition>
     </mc:Fallback>
@@ -3697,7 +3705,7 @@
           <a:p>
             <a:fld id="{191783DA-712F-492F-97F7-2286DA2B7FF6}" type="datetimeFigureOut">
               <a:rPr lang="en-US" smtClean="0"/>
-              <a:t>12/6/2014</a:t>
+              <a:t>12/12/2014</a:t>
             </a:fld>
             <a:endParaRPr lang="en-US"/>
           </a:p>
@@ -3755,14 +3763,14 @@
   <p:clrMapOvr>
     <a:masterClrMapping/>
   </p:clrMapOvr>
-  <mc:AlternateContent xmlns:mc="http://schemas.openxmlformats.org/markup-compatibility/2006" xmlns:p14="http://schemas.microsoft.com/office/powerpoint/2010/main">
-    <mc:Choice Requires="p14">
-      <p:transition spd="slow" p14:dur="800">
-        <p14:flythrough/>
+  <mc:AlternateContent xmlns:mc="http://schemas.openxmlformats.org/markup-compatibility/2006">
+    <mc:Choice xmlns:p14="http://schemas.microsoft.com/office/powerpoint/2010/main" Requires="p14">
+      <p:transition p14:dur="400">
+        <p:fade/>
       </p:transition>
     </mc:Choice>
-    <mc:Fallback xmlns="">
-      <p:transition spd="slow">
+    <mc:Fallback>
+      <p:transition>
         <p:fade/>
       </p:transition>
     </mc:Fallback>
@@ -4006,7 +4014,7 @@
           <a:p>
             <a:fld id="{191783DA-712F-492F-97F7-2286DA2B7FF6}" type="datetimeFigureOut">
               <a:rPr lang="en-US" smtClean="0"/>
-              <a:t>12/6/2014</a:t>
+              <a:t>12/12/2014</a:t>
             </a:fld>
             <a:endParaRPr lang="en-US"/>
           </a:p>
@@ -4064,14 +4072,14 @@
   <p:clrMapOvr>
     <a:masterClrMapping/>
   </p:clrMapOvr>
-  <mc:AlternateContent xmlns:mc="http://schemas.openxmlformats.org/markup-compatibility/2006" xmlns:p14="http://schemas.microsoft.com/office/powerpoint/2010/main">
-    <mc:Choice Requires="p14">
-      <p:transition spd="slow" p14:dur="800">
-        <p14:flythrough/>
+  <mc:AlternateContent xmlns:mc="http://schemas.openxmlformats.org/markup-compatibility/2006">
+    <mc:Choice xmlns:p14="http://schemas.microsoft.com/office/powerpoint/2010/main" Requires="p14">
+      <p:transition p14:dur="400">
+        <p:fade/>
       </p:transition>
     </mc:Choice>
-    <mc:Fallback xmlns="">
-      <p:transition spd="slow">
+    <mc:Fallback>
+      <p:transition>
         <p:fade/>
       </p:transition>
     </mc:Fallback>
@@ -4460,7 +4468,7 @@
           <a:p>
             <a:fld id="{191783DA-712F-492F-97F7-2286DA2B7FF6}" type="datetimeFigureOut">
               <a:rPr lang="en-US" smtClean="0"/>
-              <a:t>12/6/2014</a:t>
+              <a:t>12/12/2014</a:t>
             </a:fld>
             <a:endParaRPr lang="en-US"/>
           </a:p>
@@ -4518,14 +4526,14 @@
   <p:clrMapOvr>
     <a:masterClrMapping/>
   </p:clrMapOvr>
-  <mc:AlternateContent xmlns:mc="http://schemas.openxmlformats.org/markup-compatibility/2006" xmlns:p14="http://schemas.microsoft.com/office/powerpoint/2010/main">
-    <mc:Choice Requires="p14">
-      <p:transition spd="slow" p14:dur="800">
-        <p14:flythrough/>
+  <mc:AlternateContent xmlns:mc="http://schemas.openxmlformats.org/markup-compatibility/2006">
+    <mc:Choice xmlns:p14="http://schemas.microsoft.com/office/powerpoint/2010/main" Requires="p14">
+      <p:transition p14:dur="400">
+        <p:fade/>
       </p:transition>
     </mc:Choice>
-    <mc:Fallback xmlns="">
-      <p:transition spd="slow">
+    <mc:Fallback>
+      <p:transition>
         <p:fade/>
       </p:transition>
     </mc:Fallback>
@@ -4590,7 +4598,7 @@
           <a:p>
             <a:fld id="{191783DA-712F-492F-97F7-2286DA2B7FF6}" type="datetimeFigureOut">
               <a:rPr lang="en-US" smtClean="0"/>
-              <a:t>12/6/2014</a:t>
+              <a:t>12/12/2014</a:t>
             </a:fld>
             <a:endParaRPr lang="en-US"/>
           </a:p>
@@ -4648,14 +4656,14 @@
   <p:clrMapOvr>
     <a:masterClrMapping/>
   </p:clrMapOvr>
-  <mc:AlternateContent xmlns:mc="http://schemas.openxmlformats.org/markup-compatibility/2006" xmlns:p14="http://schemas.microsoft.com/office/powerpoint/2010/main">
-    <mc:Choice Requires="p14">
-      <p:transition spd="slow" p14:dur="800">
-        <p14:flythrough/>
+  <mc:AlternateContent xmlns:mc="http://schemas.openxmlformats.org/markup-compatibility/2006">
+    <mc:Choice xmlns:p14="http://schemas.microsoft.com/office/powerpoint/2010/main" Requires="p14">
+      <p:transition p14:dur="400">
+        <p:fade/>
       </p:transition>
     </mc:Choice>
-    <mc:Fallback xmlns="">
-      <p:transition spd="slow">
+    <mc:Fallback>
+      <p:transition>
         <p:fade/>
       </p:transition>
     </mc:Fallback>
@@ -4697,7 +4705,7 @@
           <a:p>
             <a:fld id="{191783DA-712F-492F-97F7-2286DA2B7FF6}" type="datetimeFigureOut">
               <a:rPr lang="en-US" smtClean="0"/>
-              <a:t>12/6/2014</a:t>
+              <a:t>12/12/2014</a:t>
             </a:fld>
             <a:endParaRPr lang="en-US"/>
           </a:p>
@@ -4755,14 +4763,14 @@
   <p:clrMapOvr>
     <a:masterClrMapping/>
   </p:clrMapOvr>
-  <mc:AlternateContent xmlns:mc="http://schemas.openxmlformats.org/markup-compatibility/2006" xmlns:p14="http://schemas.microsoft.com/office/powerpoint/2010/main">
-    <mc:Choice Requires="p14">
-      <p:transition spd="slow" p14:dur="800">
-        <p14:flythrough/>
+  <mc:AlternateContent xmlns:mc="http://schemas.openxmlformats.org/markup-compatibility/2006">
+    <mc:Choice xmlns:p14="http://schemas.microsoft.com/office/powerpoint/2010/main" Requires="p14">
+      <p:transition p14:dur="400">
+        <p:fade/>
       </p:transition>
     </mc:Choice>
-    <mc:Fallback xmlns="">
-      <p:transition spd="slow">
+    <mc:Fallback>
+      <p:transition>
         <p:fade/>
       </p:transition>
     </mc:Fallback>
@@ -4992,7 +5000,7 @@
           <a:p>
             <a:fld id="{191783DA-712F-492F-97F7-2286DA2B7FF6}" type="datetimeFigureOut">
               <a:rPr lang="en-US" smtClean="0"/>
-              <a:t>12/6/2014</a:t>
+              <a:t>12/12/2014</a:t>
             </a:fld>
             <a:endParaRPr lang="en-US"/>
           </a:p>
@@ -5050,14 +5058,14 @@
   <p:clrMapOvr>
     <a:masterClrMapping/>
   </p:clrMapOvr>
-  <mc:AlternateContent xmlns:mc="http://schemas.openxmlformats.org/markup-compatibility/2006" xmlns:p14="http://schemas.microsoft.com/office/powerpoint/2010/main">
-    <mc:Choice Requires="p14">
-      <p:transition spd="slow" p14:dur="800">
-        <p14:flythrough/>
+  <mc:AlternateContent xmlns:mc="http://schemas.openxmlformats.org/markup-compatibility/2006">
+    <mc:Choice xmlns:p14="http://schemas.microsoft.com/office/powerpoint/2010/main" Requires="p14">
+      <p:transition p14:dur="400">
+        <p:fade/>
       </p:transition>
     </mc:Choice>
-    <mc:Fallback xmlns="">
-      <p:transition spd="slow">
+    <mc:Fallback>
+      <p:transition>
         <p:fade/>
       </p:transition>
     </mc:Fallback>
@@ -5295,7 +5303,7 @@
           <a:p>
             <a:fld id="{191783DA-712F-492F-97F7-2286DA2B7FF6}" type="datetimeFigureOut">
               <a:rPr lang="en-US" smtClean="0"/>
-              <a:t>12/6/2014</a:t>
+              <a:t>12/12/2014</a:t>
             </a:fld>
             <a:endParaRPr lang="en-US"/>
           </a:p>
@@ -5353,14 +5361,14 @@
   <p:clrMapOvr>
     <a:masterClrMapping/>
   </p:clrMapOvr>
-  <mc:AlternateContent xmlns:mc="http://schemas.openxmlformats.org/markup-compatibility/2006" xmlns:p14="http://schemas.microsoft.com/office/powerpoint/2010/main">
-    <mc:Choice Requires="p14">
-      <p:transition spd="slow" p14:dur="800">
-        <p14:flythrough/>
+  <mc:AlternateContent xmlns:mc="http://schemas.openxmlformats.org/markup-compatibility/2006">
+    <mc:Choice xmlns:p14="http://schemas.microsoft.com/office/powerpoint/2010/main" Requires="p14">
+      <p:transition p14:dur="400">
+        <p:fade/>
       </p:transition>
     </mc:Choice>
-    <mc:Fallback xmlns="">
-      <p:transition spd="slow">
+    <mc:Fallback>
+      <p:transition>
         <p:fade/>
       </p:transition>
     </mc:Fallback>
@@ -5837,7 +5845,7 @@
           <a:p>
             <a:fld id="{191783DA-712F-492F-97F7-2286DA2B7FF6}" type="datetimeFigureOut">
               <a:rPr lang="en-US" smtClean="0"/>
-              <a:t>12/6/2014</a:t>
+              <a:t>12/12/2014</a:t>
             </a:fld>
             <a:endParaRPr lang="en-US"/>
           </a:p>
@@ -5948,14 +5956,14 @@
     <p:sldLayoutId id="2147483847" r:id="rId16"/>
     <p:sldLayoutId id="2147483848" r:id="rId17"/>
   </p:sldLayoutIdLst>
-  <mc:AlternateContent xmlns:mc="http://schemas.openxmlformats.org/markup-compatibility/2006" xmlns:p14="http://schemas.microsoft.com/office/powerpoint/2010/main">
-    <mc:Choice Requires="p14">
-      <p:transition spd="slow" p14:dur="800">
-        <p14:flythrough/>
+  <mc:AlternateContent xmlns:mc="http://schemas.openxmlformats.org/markup-compatibility/2006">
+    <mc:Choice xmlns:p14="http://schemas.microsoft.com/office/powerpoint/2010/main" Requires="p14">
+      <p:transition p14:dur="400">
+        <p:fade/>
       </p:transition>
     </mc:Choice>
-    <mc:Fallback xmlns="">
-      <p:transition spd="slow">
+    <mc:Fallback>
+      <p:transition>
         <p:fade/>
       </p:transition>
     </mc:Fallback>
@@ -6479,14 +6487,14 @@
   <p:clrMapOvr>
     <a:masterClrMapping/>
   </p:clrMapOvr>
-  <mc:AlternateContent xmlns:mc="http://schemas.openxmlformats.org/markup-compatibility/2006" xmlns:p14="http://schemas.microsoft.com/office/powerpoint/2010/main">
-    <mc:Choice Requires="p14">
-      <p:transition spd="slow" p14:dur="800">
-        <p14:flythrough/>
+  <mc:AlternateContent xmlns:mc="http://schemas.openxmlformats.org/markup-compatibility/2006">
+    <mc:Choice xmlns:p14="http://schemas.microsoft.com/office/powerpoint/2010/main" Requires="p14">
+      <p:transition p14:dur="400">
+        <p:fade/>
       </p:transition>
     </mc:Choice>
-    <mc:Fallback xmlns="">
-      <p:transition spd="slow">
+    <mc:Fallback>
+      <p:transition>
         <p:fade/>
       </p:transition>
     </mc:Fallback>
@@ -6730,14 +6738,14 @@
   <p:clrMapOvr>
     <a:masterClrMapping/>
   </p:clrMapOvr>
-  <mc:AlternateContent xmlns:mc="http://schemas.openxmlformats.org/markup-compatibility/2006" xmlns:p14="http://schemas.microsoft.com/office/powerpoint/2010/main">
-    <mc:Choice Requires="p14">
-      <p:transition spd="slow" p14:dur="800">
-        <p14:flythrough/>
+  <mc:AlternateContent xmlns:mc="http://schemas.openxmlformats.org/markup-compatibility/2006">
+    <mc:Choice xmlns:p14="http://schemas.microsoft.com/office/powerpoint/2010/main" Requires="p14">
+      <p:transition p14:dur="400">
+        <p:fade/>
       </p:transition>
     </mc:Choice>
-    <mc:Fallback xmlns="">
-      <p:transition spd="slow">
+    <mc:Fallback>
+      <p:transition>
         <p:fade/>
       </p:transition>
     </mc:Fallback>
@@ -6949,14 +6957,14 @@
   <p:clrMapOvr>
     <a:masterClrMapping/>
   </p:clrMapOvr>
-  <mc:AlternateContent xmlns:mc="http://schemas.openxmlformats.org/markup-compatibility/2006" xmlns:p14="http://schemas.microsoft.com/office/powerpoint/2010/main">
-    <mc:Choice Requires="p14">
-      <p:transition spd="slow" p14:dur="800">
-        <p14:flythrough/>
+  <mc:AlternateContent xmlns:mc="http://schemas.openxmlformats.org/markup-compatibility/2006">
+    <mc:Choice xmlns:p14="http://schemas.microsoft.com/office/powerpoint/2010/main" Requires="p14">
+      <p:transition p14:dur="400">
+        <p:fade/>
       </p:transition>
     </mc:Choice>
-    <mc:Fallback xmlns="">
-      <p:transition spd="slow">
+    <mc:Fallback>
+      <p:transition>
         <p:fade/>
       </p:transition>
     </mc:Fallback>
@@ -7157,14 +7165,14 @@
   <p:clrMapOvr>
     <a:masterClrMapping/>
   </p:clrMapOvr>
-  <mc:AlternateContent xmlns:mc="http://schemas.openxmlformats.org/markup-compatibility/2006" xmlns:p14="http://schemas.microsoft.com/office/powerpoint/2010/main">
-    <mc:Choice Requires="p14">
-      <p:transition spd="slow" p14:dur="800">
-        <p14:flythrough/>
+  <mc:AlternateContent xmlns:mc="http://schemas.openxmlformats.org/markup-compatibility/2006">
+    <mc:Choice xmlns:p14="http://schemas.microsoft.com/office/powerpoint/2010/main" Requires="p14">
+      <p:transition p14:dur="400">
+        <p:fade/>
       </p:transition>
     </mc:Choice>
-    <mc:Fallback xmlns="">
-      <p:transition spd="slow">
+    <mc:Fallback>
+      <p:transition>
         <p:fade/>
       </p:transition>
     </mc:Fallback>
@@ -7365,14 +7373,14 @@
   <p:clrMapOvr>
     <a:masterClrMapping/>
   </p:clrMapOvr>
-  <mc:AlternateContent xmlns:mc="http://schemas.openxmlformats.org/markup-compatibility/2006" xmlns:p14="http://schemas.microsoft.com/office/powerpoint/2010/main">
-    <mc:Choice Requires="p14">
-      <p:transition spd="slow" p14:dur="800">
-        <p14:flythrough/>
+  <mc:AlternateContent xmlns:mc="http://schemas.openxmlformats.org/markup-compatibility/2006">
+    <mc:Choice xmlns:p14="http://schemas.microsoft.com/office/powerpoint/2010/main" Requires="p14">
+      <p:transition p14:dur="400">
+        <p:fade/>
       </p:transition>
     </mc:Choice>
-    <mc:Fallback xmlns="">
-      <p:transition spd="slow">
+    <mc:Fallback>
+      <p:transition>
         <p:fade/>
       </p:transition>
     </mc:Fallback>
@@ -7574,14 +7582,14 @@
   <p:clrMapOvr>
     <a:masterClrMapping/>
   </p:clrMapOvr>
-  <mc:AlternateContent xmlns:mc="http://schemas.openxmlformats.org/markup-compatibility/2006" xmlns:p14="http://schemas.microsoft.com/office/powerpoint/2010/main">
-    <mc:Choice Requires="p14">
-      <p:transition spd="slow" p14:dur="800">
-        <p14:flythrough/>
+  <mc:AlternateContent xmlns:mc="http://schemas.openxmlformats.org/markup-compatibility/2006">
+    <mc:Choice xmlns:p14="http://schemas.microsoft.com/office/powerpoint/2010/main" Requires="p14">
+      <p:transition p14:dur="400">
+        <p:fade/>
       </p:transition>
     </mc:Choice>
-    <mc:Fallback xmlns="">
-      <p:transition spd="slow">
+    <mc:Fallback>
+      <p:transition>
         <p:fade/>
       </p:transition>
     </mc:Fallback>
@@ -7764,14 +7772,14 @@
   <p:clrMapOvr>
     <a:masterClrMapping/>
   </p:clrMapOvr>
-  <mc:AlternateContent xmlns:mc="http://schemas.openxmlformats.org/markup-compatibility/2006" xmlns:p14="http://schemas.microsoft.com/office/powerpoint/2010/main">
-    <mc:Choice Requires="p14">
-      <p:transition spd="slow" p14:dur="800">
-        <p14:flythrough/>
+  <mc:AlternateContent xmlns:mc="http://schemas.openxmlformats.org/markup-compatibility/2006">
+    <mc:Choice xmlns:p14="http://schemas.microsoft.com/office/powerpoint/2010/main" Requires="p14">
+      <p:transition p14:dur="400">
+        <p:fade/>
       </p:transition>
     </mc:Choice>
-    <mc:Fallback xmlns="">
-      <p:transition spd="slow">
+    <mc:Fallback>
+      <p:transition>
         <p:fade/>
       </p:transition>
     </mc:Fallback>
@@ -7954,14 +7962,14 @@
   <p:clrMapOvr>
     <a:masterClrMapping/>
   </p:clrMapOvr>
-  <mc:AlternateContent xmlns:mc="http://schemas.openxmlformats.org/markup-compatibility/2006" xmlns:p14="http://schemas.microsoft.com/office/powerpoint/2010/main">
-    <mc:Choice Requires="p14">
-      <p:transition spd="slow" p14:dur="800">
-        <p14:flythrough/>
+  <mc:AlternateContent xmlns:mc="http://schemas.openxmlformats.org/markup-compatibility/2006">
+    <mc:Choice xmlns:p14="http://schemas.microsoft.com/office/powerpoint/2010/main" Requires="p14">
+      <p:transition p14:dur="400">
+        <p:fade/>
       </p:transition>
     </mc:Choice>
-    <mc:Fallback xmlns="">
-      <p:transition spd="slow">
+    <mc:Fallback>
+      <p:transition>
         <p:fade/>
       </p:transition>
     </mc:Fallback>
@@ -8071,7 +8079,6 @@
               <a:rPr lang="en-US" sz="6000" b="1" dirty="0" smtClean="0"/>
               <a:t>Messaging</a:t>
             </a:r>
-            <a:endParaRPr lang="en-US" sz="6000" b="1" dirty="0" smtClean="0"/>
           </a:p>
         </p:txBody>
       </p:sp>
@@ -8145,14 +8152,14 @@
   <p:clrMapOvr>
     <a:masterClrMapping/>
   </p:clrMapOvr>
-  <mc:AlternateContent xmlns:mc="http://schemas.openxmlformats.org/markup-compatibility/2006" xmlns:p14="http://schemas.microsoft.com/office/powerpoint/2010/main">
-    <mc:Choice Requires="p14">
-      <p:transition spd="slow" p14:dur="800">
-        <p14:flythrough/>
+  <mc:AlternateContent xmlns:mc="http://schemas.openxmlformats.org/markup-compatibility/2006">
+    <mc:Choice xmlns:p14="http://schemas.microsoft.com/office/powerpoint/2010/main" Requires="p14">
+      <p:transition p14:dur="400">
+        <p:fade/>
       </p:transition>
     </mc:Choice>
-    <mc:Fallback xmlns="">
-      <p:transition spd="slow">
+    <mc:Fallback>
+      <p:transition>
         <p:fade/>
       </p:transition>
     </mc:Fallback>
@@ -8295,14 +8302,14 @@
   <p:clrMapOvr>
     <a:masterClrMapping/>
   </p:clrMapOvr>
-  <mc:AlternateContent xmlns:mc="http://schemas.openxmlformats.org/markup-compatibility/2006" xmlns:p14="http://schemas.microsoft.com/office/powerpoint/2010/main">
-    <mc:Choice Requires="p14">
-      <p:transition spd="slow" p14:dur="800">
-        <p14:flythrough/>
+  <mc:AlternateContent xmlns:mc="http://schemas.openxmlformats.org/markup-compatibility/2006">
+    <mc:Choice xmlns:p14="http://schemas.microsoft.com/office/powerpoint/2010/main" Requires="p14">
+      <p:transition p14:dur="400">
+        <p:fade/>
       </p:transition>
     </mc:Choice>
-    <mc:Fallback xmlns="">
-      <p:transition spd="slow">
+    <mc:Fallback>
+      <p:transition>
         <p:fade/>
       </p:transition>
     </mc:Fallback>
@@ -8359,32 +8366,7 @@
             <a:pPr marL="0" indent="0" algn="ctr">
               <a:buNone/>
             </a:pPr>
-            <a:r>
-              <a:rPr lang="en-US" sz="3200" dirty="0" smtClean="0"/>
-              <a:t>Database</a:t>
-            </a:r>
-          </a:p>
-          <a:p>
-            <a:pPr marL="0" indent="0" algn="ctr">
-              <a:buNone/>
-            </a:pPr>
-            <a:r>
-              <a:rPr lang="en-US" sz="3200" dirty="0" smtClean="0"/>
-              <a:t>Tomcat App</a:t>
-            </a:r>
-          </a:p>
-          <a:p>
-            <a:pPr marL="0" indent="0" algn="ctr">
-              <a:buNone/>
-            </a:pPr>
-            <a:r>
-              <a:rPr lang="en-US" sz="3200" dirty="0" err="1" smtClean="0"/>
-              <a:t>AngularJS</a:t>
-            </a:r>
-            <a:r>
-              <a:rPr lang="en-US" sz="3200" dirty="0" smtClean="0"/>
-              <a:t> Web-App</a:t>
-            </a:r>
+            <a:endParaRPr lang="en-US" sz="3200" dirty="0" smtClean="0"/>
           </a:p>
         </p:txBody>
       </p:sp>
@@ -8396,7 +8378,7 @@
         </p:nvSpPr>
         <p:spPr>
           <a:xfrm>
-            <a:off x="1397964" y="1014153"/>
+            <a:off x="1397964" y="91440"/>
             <a:ext cx="10794036" cy="1015663"/>
           </a:xfrm>
           <a:prstGeom prst="rect">
@@ -8413,8 +8395,9 @@
             <a:pPr algn="ctr"/>
             <a:r>
               <a:rPr lang="en-US" sz="6000" b="1" dirty="0" smtClean="0"/>
-              <a:t>Top Level</a:t>
-            </a:r>
+              <a:t>Components</a:t>
+            </a:r>
+            <a:endParaRPr lang="en-US" sz="6000" b="1" dirty="0" smtClean="0"/>
           </a:p>
         </p:txBody>
       </p:sp>
@@ -8448,24 +8431,48 @@
           </a:prstGeom>
         </p:spPr>
       </p:pic>
+      <p:pic>
+        <p:nvPicPr>
+          <p:cNvPr id="5" name="Picture 4"/>
+          <p:cNvPicPr>
+            <a:picLocks noChangeAspect="1"/>
+          </p:cNvPicPr>
+          <p:nvPr/>
+        </p:nvPicPr>
+        <p:blipFill>
+          <a:blip r:embed="rId3"/>
+          <a:stretch>
+            <a:fillRect/>
+          </a:stretch>
+        </p:blipFill>
+        <p:spPr>
+          <a:xfrm>
+            <a:off x="3366234" y="1154371"/>
+            <a:ext cx="6857494" cy="5530876"/>
+          </a:xfrm>
+          <a:prstGeom prst="rect">
+            <a:avLst/>
+          </a:prstGeom>
+        </p:spPr>
+      </p:pic>
     </p:spTree>
     <p:extLst>
       <p:ext uri="{BB962C8B-B14F-4D97-AF65-F5344CB8AC3E}">
-        <p14:creationId xmlns:p14="http://schemas.microsoft.com/office/powerpoint/2010/main" val="2606593379"/>
+        <p14:creationId xmlns:p14="http://schemas.microsoft.com/office/powerpoint/2010/main" val="3566259048"/>
       </p:ext>
     </p:extLst>
   </p:cSld>
   <p:clrMapOvr>
     <a:masterClrMapping/>
   </p:clrMapOvr>
-  <mc:AlternateContent xmlns:mc="http://schemas.openxmlformats.org/markup-compatibility/2006" xmlns:p14="http://schemas.microsoft.com/office/powerpoint/2010/main">
-    <mc:Choice Requires="p14">
-      <p:transition spd="slow" p14:dur="800">
-        <p14:flythrough/>
+  <mc:AlternateContent xmlns:mc="http://schemas.openxmlformats.org/markup-compatibility/2006">
+    <mc:Choice xmlns:p14="http://schemas.microsoft.com/office/powerpoint/2010/main" Requires="p14">
+      <p:transition p14:dur="400">
+        <p:fade/>
       </p:transition>
     </mc:Choice>
-    <mc:Fallback xmlns="">
-      <p:transition spd="slow">
+    <mc:Fallback>
+      <p:transition>
         <p:fade/>
       </p:transition>
     </mc:Fallback>
@@ -8560,8 +8567,9 @@
             </a:pPr>
             <a:r>
               <a:rPr lang="en-US" sz="3200" dirty="0" smtClean="0"/>
-              <a:t>Future Enhancements</a:t>
-            </a:r>
+              <a:t>Target Functionality</a:t>
+            </a:r>
+            <a:endParaRPr lang="en-US" sz="3200" dirty="0" smtClean="0"/>
           </a:p>
           <a:p>
             <a:pPr marL="0" indent="0" algn="ctr">
@@ -8680,14 +8688,14 @@
   <p:clrMapOvr>
     <a:masterClrMapping/>
   </p:clrMapOvr>
-  <mc:AlternateContent xmlns:mc="http://schemas.openxmlformats.org/markup-compatibility/2006" xmlns:p14="http://schemas.microsoft.com/office/powerpoint/2010/main">
-    <mc:Choice Requires="p14">
-      <p:transition spd="slow" p14:dur="800">
-        <p14:flythrough/>
+  <mc:AlternateContent xmlns:mc="http://schemas.openxmlformats.org/markup-compatibility/2006">
+    <mc:Choice xmlns:p14="http://schemas.microsoft.com/office/powerpoint/2010/main" Requires="p14">
+      <p:transition p14:dur="400">
+        <p:fade/>
       </p:transition>
     </mc:Choice>
-    <mc:Fallback xmlns="">
-      <p:transition spd="slow">
+    <mc:Fallback>
+      <p:transition>
         <p:fade/>
       </p:transition>
     </mc:Fallback>
@@ -8731,8 +8739,8 @@
         </p:nvSpPr>
         <p:spPr>
           <a:xfrm>
-            <a:off x="1785625" y="2156321"/>
-            <a:ext cx="10018713" cy="4528926"/>
+            <a:off x="1236984" y="3162161"/>
+            <a:ext cx="3644177" cy="4528926"/>
           </a:xfrm>
         </p:spPr>
         <p:txBody>
@@ -8746,7 +8754,7 @@
             </a:pPr>
             <a:r>
               <a:rPr lang="en-US" sz="3200" dirty="0" smtClean="0"/>
-              <a:t>MySQL</a:t>
+              <a:t>Database</a:t>
             </a:r>
           </a:p>
           <a:p>
@@ -8755,7 +8763,7 @@
             </a:pPr>
             <a:r>
               <a:rPr lang="en-US" sz="3200" dirty="0" smtClean="0"/>
-              <a:t>Centralized User System</a:t>
+              <a:t>Tomcat App</a:t>
             </a:r>
           </a:p>
           <a:p>
@@ -8763,8 +8771,12 @@
               <a:buNone/>
             </a:pPr>
             <a:r>
+              <a:rPr lang="en-US" sz="3200" dirty="0" err="1" smtClean="0"/>
+              <a:t>AngularJS</a:t>
+            </a:r>
+            <a:r>
               <a:rPr lang="en-US" sz="3200" dirty="0" smtClean="0"/>
-              <a:t>Multi-Tenant Business Schemas</a:t>
+              <a:t> Web-App</a:t>
             </a:r>
           </a:p>
         </p:txBody>
@@ -8794,7 +8806,7 @@
             <a:pPr algn="ctr"/>
             <a:r>
               <a:rPr lang="en-US" sz="6000" b="1" dirty="0" smtClean="0"/>
-              <a:t>Database</a:t>
+              <a:t>Top Level</a:t>
             </a:r>
           </a:p>
         </p:txBody>
@@ -8829,24 +8841,54 @@
           </a:prstGeom>
         </p:spPr>
       </p:pic>
+      <p:pic>
+        <p:nvPicPr>
+          <p:cNvPr id="4" name="Picture 3"/>
+          <p:cNvPicPr>
+            <a:picLocks noChangeAspect="1"/>
+          </p:cNvPicPr>
+          <p:nvPr/>
+        </p:nvPicPr>
+        <p:blipFill>
+          <a:blip r:embed="rId3">
+            <a:extLst>
+              <a:ext uri="{28A0092B-C50C-407E-A947-70E740481C1C}">
+                <a14:useLocalDpi xmlns:a14="http://schemas.microsoft.com/office/drawing/2010/main" val="0"/>
+              </a:ext>
+            </a:extLst>
+          </a:blip>
+          <a:stretch>
+            <a:fillRect/>
+          </a:stretch>
+        </p:blipFill>
+        <p:spPr>
+          <a:xfrm>
+            <a:off x="4789722" y="2121256"/>
+            <a:ext cx="6374536" cy="4576960"/>
+          </a:xfrm>
+          <a:prstGeom prst="rect">
+            <a:avLst/>
+          </a:prstGeom>
+        </p:spPr>
+      </p:pic>
     </p:spTree>
     <p:extLst>
       <p:ext uri="{BB962C8B-B14F-4D97-AF65-F5344CB8AC3E}">
-        <p14:creationId xmlns:p14="http://schemas.microsoft.com/office/powerpoint/2010/main" val="3566259048"/>
+        <p14:creationId xmlns:p14="http://schemas.microsoft.com/office/powerpoint/2010/main" val="2606593379"/>
       </p:ext>
     </p:extLst>
   </p:cSld>
   <p:clrMapOvr>
     <a:masterClrMapping/>
   </p:clrMapOvr>
-  <mc:AlternateContent xmlns:mc="http://schemas.openxmlformats.org/markup-compatibility/2006" xmlns:p14="http://schemas.microsoft.com/office/powerpoint/2010/main">
-    <mc:Choice Requires="p14">
-      <p:transition spd="slow" p14:dur="800">
-        <p14:flythrough/>
+  <mc:AlternateContent xmlns:mc="http://schemas.openxmlformats.org/markup-compatibility/2006">
+    <mc:Choice xmlns:p14="http://schemas.microsoft.com/office/powerpoint/2010/main" Requires="p14">
+      <p:transition p14:dur="400">
+        <p:fade/>
       </p:transition>
     </mc:Choice>
-    <mc:Fallback xmlns="">
-      <p:transition spd="slow">
+    <mc:Fallback>
+      <p:transition>
         <p:fade/>
       </p:transition>
     </mc:Fallback>
@@ -8905,7 +8947,7 @@
             </a:pPr>
             <a:r>
               <a:rPr lang="en-US" sz="3200" dirty="0" smtClean="0"/>
-              <a:t>JAX-RS &amp; Quartz</a:t>
+              <a:t>MySQL</a:t>
             </a:r>
           </a:p>
           <a:p>
@@ -8914,7 +8956,7 @@
             </a:pPr>
             <a:r>
               <a:rPr lang="en-US" sz="3200" dirty="0" smtClean="0"/>
-              <a:t>Hibernate</a:t>
+              <a:t>Centralized User System</a:t>
             </a:r>
           </a:p>
           <a:p>
@@ -8923,16 +8965,7 @@
             </a:pPr>
             <a:r>
               <a:rPr lang="en-US" sz="3200" dirty="0" smtClean="0"/>
-              <a:t>Cache</a:t>
-            </a:r>
-          </a:p>
-          <a:p>
-            <a:pPr marL="0" indent="0" algn="ctr">
-              <a:buNone/>
-            </a:pPr>
-            <a:r>
-              <a:rPr lang="en-US" sz="3200" dirty="0" smtClean="0"/>
-              <a:t>GSON Data Types</a:t>
+              <a:t>Multi-Tenant Business Schemas</a:t>
             </a:r>
           </a:p>
         </p:txBody>
@@ -8962,7 +8995,7 @@
             <a:pPr algn="ctr"/>
             <a:r>
               <a:rPr lang="en-US" sz="6000" b="1" dirty="0" smtClean="0"/>
-              <a:t>Tomcat Applications</a:t>
+              <a:t>Database</a:t>
             </a:r>
           </a:p>
         </p:txBody>
@@ -9000,21 +9033,21 @@
     </p:spTree>
     <p:extLst>
       <p:ext uri="{BB962C8B-B14F-4D97-AF65-F5344CB8AC3E}">
-        <p14:creationId xmlns:p14="http://schemas.microsoft.com/office/powerpoint/2010/main" val="2321954493"/>
+        <p14:creationId xmlns:p14="http://schemas.microsoft.com/office/powerpoint/2010/main" val="3424626798"/>
       </p:ext>
     </p:extLst>
   </p:cSld>
   <p:clrMapOvr>
     <a:masterClrMapping/>
   </p:clrMapOvr>
-  <mc:AlternateContent xmlns:mc="http://schemas.openxmlformats.org/markup-compatibility/2006" xmlns:p14="http://schemas.microsoft.com/office/powerpoint/2010/main">
-    <mc:Choice Requires="p14">
-      <p:transition spd="slow" p14:dur="800">
-        <p14:flythrough/>
+  <mc:AlternateContent xmlns:mc="http://schemas.openxmlformats.org/markup-compatibility/2006">
+    <mc:Choice xmlns:p14="http://schemas.microsoft.com/office/powerpoint/2010/main" Requires="p14">
+      <p:transition p14:dur="400">
+        <p:fade/>
       </p:transition>
     </mc:Choice>
-    <mc:Fallback xmlns="">
-      <p:transition spd="slow">
+    <mc:Fallback>
+      <p:transition>
         <p:fade/>
       </p:transition>
     </mc:Fallback>
@@ -9071,28 +9104,7 @@
             <a:pPr marL="0" indent="0" algn="ctr">
               <a:buNone/>
             </a:pPr>
-            <a:r>
-              <a:rPr lang="en-US" sz="3200" dirty="0" smtClean="0"/>
-              <a:t>Service Director</a:t>
-            </a:r>
-          </a:p>
-          <a:p>
-            <a:pPr marL="0" indent="0" algn="ctr">
-              <a:buNone/>
-            </a:pPr>
-            <a:r>
-              <a:rPr lang="en-US" sz="3200" dirty="0" smtClean="0"/>
-              <a:t>User Authentication</a:t>
-            </a:r>
-          </a:p>
-          <a:p>
-            <a:pPr marL="0" indent="0" algn="ctr">
-              <a:buNone/>
-            </a:pPr>
-            <a:r>
-              <a:rPr lang="en-US" sz="3200" dirty="0" smtClean="0"/>
-              <a:t>Registration and Settings</a:t>
-            </a:r>
+            <a:endParaRPr lang="en-US" sz="3200" dirty="0" smtClean="0"/>
           </a:p>
         </p:txBody>
       </p:sp>
@@ -9104,7 +9116,7 @@
         </p:nvSpPr>
         <p:spPr>
           <a:xfrm>
-            <a:off x="1397964" y="1014153"/>
+            <a:off x="1397963" y="0"/>
             <a:ext cx="10794036" cy="1015663"/>
           </a:xfrm>
           <a:prstGeom prst="rect">
@@ -9121,8 +9133,13 @@
             <a:pPr algn="ctr"/>
             <a:r>
               <a:rPr lang="en-US" sz="6000" b="1" dirty="0" smtClean="0"/>
-              <a:t>Accounts Application</a:t>
-            </a:r>
+              <a:t>Accounts </a:t>
+            </a:r>
+            <a:r>
+              <a:rPr lang="en-US" sz="6000" b="1" dirty="0" smtClean="0"/>
+              <a:t>Database</a:t>
+            </a:r>
+            <a:endParaRPr lang="en-US" sz="6000" b="1" dirty="0" smtClean="0"/>
           </a:p>
         </p:txBody>
       </p:sp>
@@ -9156,24 +9173,48 @@
           </a:prstGeom>
         </p:spPr>
       </p:pic>
+      <p:pic>
+        <p:nvPicPr>
+          <p:cNvPr id="4" name="Picture 3"/>
+          <p:cNvPicPr>
+            <a:picLocks noChangeAspect="1"/>
+          </p:cNvPicPr>
+          <p:nvPr/>
+        </p:nvPicPr>
+        <p:blipFill>
+          <a:blip r:embed="rId3"/>
+          <a:stretch>
+            <a:fillRect/>
+          </a:stretch>
+        </p:blipFill>
+        <p:spPr>
+          <a:xfrm>
+            <a:off x="2875429" y="1015663"/>
+            <a:ext cx="8242655" cy="5669584"/>
+          </a:xfrm>
+          <a:prstGeom prst="rect">
+            <a:avLst/>
+          </a:prstGeom>
+        </p:spPr>
+      </p:pic>
     </p:spTree>
     <p:extLst>
       <p:ext uri="{BB962C8B-B14F-4D97-AF65-F5344CB8AC3E}">
-        <p14:creationId xmlns:p14="http://schemas.microsoft.com/office/powerpoint/2010/main" val="1358627340"/>
+        <p14:creationId xmlns:p14="http://schemas.microsoft.com/office/powerpoint/2010/main" val="3746386950"/>
       </p:ext>
     </p:extLst>
   </p:cSld>
   <p:clrMapOvr>
     <a:masterClrMapping/>
   </p:clrMapOvr>
-  <mc:AlternateContent xmlns:mc="http://schemas.openxmlformats.org/markup-compatibility/2006" xmlns:p14="http://schemas.microsoft.com/office/powerpoint/2010/main">
-    <mc:Choice Requires="p14">
-      <p:transition spd="slow" p14:dur="800">
-        <p14:flythrough/>
+  <mc:AlternateContent xmlns:mc="http://schemas.openxmlformats.org/markup-compatibility/2006">
+    <mc:Choice xmlns:p14="http://schemas.microsoft.com/office/powerpoint/2010/main" Requires="p14">
+      <p:transition p14:dur="400">
+        <p:fade/>
       </p:transition>
     </mc:Choice>
-    <mc:Fallback xmlns="">
-      <p:transition spd="slow">
+    <mc:Fallback>
+      <p:transition>
         <p:fade/>
       </p:transition>
     </mc:Fallback>
@@ -9230,67 +9271,7 @@
             <a:pPr marL="0" indent="0" algn="ctr">
               <a:buNone/>
             </a:pPr>
-            <a:r>
-              <a:rPr lang="en-US" sz="3200" dirty="0" smtClean="0"/>
-              <a:t>Many Businesses Each</a:t>
-            </a:r>
-          </a:p>
-          <a:p>
-            <a:pPr marL="0" indent="0" algn="ctr">
-              <a:buNone/>
-            </a:pPr>
-            <a:r>
-              <a:rPr lang="en-US" sz="3200" dirty="0" smtClean="0"/>
-              <a:t>Employees &amp; Managers</a:t>
-            </a:r>
-          </a:p>
-          <a:p>
-            <a:pPr marL="0" indent="0" algn="ctr">
-              <a:buNone/>
-            </a:pPr>
-            <a:r>
-              <a:rPr lang="en-US" sz="3200" dirty="0" smtClean="0"/>
-              <a:t>Schedules</a:t>
-            </a:r>
-          </a:p>
-          <a:p>
-            <a:pPr marL="0" indent="0" algn="ctr">
-              <a:buNone/>
-            </a:pPr>
-            <a:r>
-              <a:rPr lang="en-US" sz="3200" dirty="0" smtClean="0"/>
-              <a:t>Messaging</a:t>
-            </a:r>
-          </a:p>
-        </p:txBody>
-      </p:sp>
-      <p:sp>
-        <p:nvSpPr>
-          <p:cNvPr id="2" name="TextBox 1"/>
-          <p:cNvSpPr txBox="1"/>
-          <p:nvPr/>
-        </p:nvSpPr>
-        <p:spPr>
-          <a:xfrm>
-            <a:off x="1397964" y="1014153"/>
-            <a:ext cx="10794036" cy="1015663"/>
-          </a:xfrm>
-          <a:prstGeom prst="rect">
-            <a:avLst/>
-          </a:prstGeom>
-          <a:noFill/>
-        </p:spPr>
-        <p:txBody>
-          <a:bodyPr wrap="square" rtlCol="0">
-            <a:spAutoFit/>
-          </a:bodyPr>
-          <a:lstStyle/>
-          <a:p>
-            <a:pPr algn="ctr"/>
-            <a:r>
-              <a:rPr lang="en-US" sz="6000" b="1" dirty="0" smtClean="0"/>
-              <a:t>Business Application</a:t>
-            </a:r>
+            <a:endParaRPr lang="en-US" sz="3200" dirty="0" smtClean="0"/>
           </a:p>
         </p:txBody>
       </p:sp>
@@ -9324,24 +9305,79 @@
           </a:prstGeom>
         </p:spPr>
       </p:pic>
+      <p:pic>
+        <p:nvPicPr>
+          <p:cNvPr id="5" name="Picture 4"/>
+          <p:cNvPicPr>
+            <a:picLocks noChangeAspect="1"/>
+          </p:cNvPicPr>
+          <p:nvPr/>
+        </p:nvPicPr>
+        <p:blipFill>
+          <a:blip r:embed="rId3"/>
+          <a:stretch>
+            <a:fillRect/>
+          </a:stretch>
+        </p:blipFill>
+        <p:spPr>
+          <a:xfrm>
+            <a:off x="465512" y="673960"/>
+            <a:ext cx="9155385" cy="6090176"/>
+          </a:xfrm>
+          <a:prstGeom prst="rect">
+            <a:avLst/>
+          </a:prstGeom>
+        </p:spPr>
+      </p:pic>
+      <p:sp>
+        <p:nvSpPr>
+          <p:cNvPr id="2" name="TextBox 1"/>
+          <p:cNvSpPr txBox="1"/>
+          <p:nvPr/>
+        </p:nvSpPr>
+        <p:spPr>
+          <a:xfrm>
+            <a:off x="2752938" y="0"/>
+            <a:ext cx="10794036" cy="1015663"/>
+          </a:xfrm>
+          <a:prstGeom prst="rect">
+            <a:avLst/>
+          </a:prstGeom>
+          <a:noFill/>
+        </p:spPr>
+        <p:txBody>
+          <a:bodyPr wrap="square" rtlCol="0">
+            <a:spAutoFit/>
+          </a:bodyPr>
+          <a:lstStyle/>
+          <a:p>
+            <a:pPr algn="ctr"/>
+            <a:r>
+              <a:rPr lang="en-US" sz="6000" b="1" dirty="0" smtClean="0"/>
+              <a:t>Business Database</a:t>
+            </a:r>
+            <a:endParaRPr lang="en-US" sz="6000" b="1" dirty="0" smtClean="0"/>
+          </a:p>
+        </p:txBody>
+      </p:sp>
     </p:spTree>
     <p:extLst>
       <p:ext uri="{BB962C8B-B14F-4D97-AF65-F5344CB8AC3E}">
-        <p14:creationId xmlns:p14="http://schemas.microsoft.com/office/powerpoint/2010/main" val="121259362"/>
+        <p14:creationId xmlns:p14="http://schemas.microsoft.com/office/powerpoint/2010/main" val="1624565025"/>
       </p:ext>
     </p:extLst>
   </p:cSld>
   <p:clrMapOvr>
     <a:masterClrMapping/>
   </p:clrMapOvr>
-  <mc:AlternateContent xmlns:mc="http://schemas.openxmlformats.org/markup-compatibility/2006" xmlns:p14="http://schemas.microsoft.com/office/powerpoint/2010/main">
-    <mc:Choice Requires="p14">
-      <p:transition spd="slow" p14:dur="800">
-        <p14:flythrough/>
+  <mc:AlternateContent xmlns:mc="http://schemas.openxmlformats.org/markup-compatibility/2006">
+    <mc:Choice xmlns:p14="http://schemas.microsoft.com/office/powerpoint/2010/main" Requires="p14">
+      <p:transition p14:dur="400">
+        <p:fade/>
       </p:transition>
     </mc:Choice>
-    <mc:Fallback xmlns="">
-      <p:transition spd="slow">
+    <mc:Fallback>
+      <p:transition>
         <p:fade/>
       </p:transition>
     </mc:Fallback>
@@ -9399,12 +9435,8 @@
               <a:buNone/>
             </a:pPr>
             <a:r>
-              <a:rPr lang="en-US" sz="3200" dirty="0" err="1" smtClean="0"/>
-              <a:t>Nexmo</a:t>
-            </a:r>
-            <a:r>
               <a:rPr lang="en-US" sz="3200" dirty="0" smtClean="0"/>
-              <a:t> SMS Service</a:t>
+              <a:t>JAX-RS &amp; Quartz</a:t>
             </a:r>
           </a:p>
           <a:p>
@@ -9413,7 +9445,7 @@
             </a:pPr>
             <a:r>
               <a:rPr lang="en-US" sz="3200" dirty="0" smtClean="0"/>
-              <a:t>SMTP Mail Server</a:t>
+              <a:t>Hibernate</a:t>
             </a:r>
           </a:p>
           <a:p>
@@ -9422,7 +9454,16 @@
             </a:pPr>
             <a:r>
               <a:rPr lang="en-US" sz="3200" dirty="0" smtClean="0"/>
-              <a:t>API for Application Alerts</a:t>
+              <a:t>Cache</a:t>
+            </a:r>
+          </a:p>
+          <a:p>
+            <a:pPr marL="0" indent="0" algn="ctr">
+              <a:buNone/>
+            </a:pPr>
+            <a:r>
+              <a:rPr lang="en-US" sz="3200" dirty="0" smtClean="0"/>
+              <a:t>GSON Data Types</a:t>
             </a:r>
           </a:p>
         </p:txBody>
@@ -9452,7 +9493,7 @@
             <a:pPr algn="ctr"/>
             <a:r>
               <a:rPr lang="en-US" sz="6000" b="1" dirty="0" smtClean="0"/>
-              <a:t>Notifications Application</a:t>
+              <a:t>Tomcat Applications</a:t>
             </a:r>
           </a:p>
         </p:txBody>
@@ -9490,21 +9531,21 @@
     </p:spTree>
     <p:extLst>
       <p:ext uri="{BB962C8B-B14F-4D97-AF65-F5344CB8AC3E}">
-        <p14:creationId xmlns:p14="http://schemas.microsoft.com/office/powerpoint/2010/main" val="1968878506"/>
+        <p14:creationId xmlns:p14="http://schemas.microsoft.com/office/powerpoint/2010/main" val="2321954493"/>
       </p:ext>
     </p:extLst>
   </p:cSld>
   <p:clrMapOvr>
     <a:masterClrMapping/>
   </p:clrMapOvr>
-  <mc:AlternateContent xmlns:mc="http://schemas.openxmlformats.org/markup-compatibility/2006" xmlns:p14="http://schemas.microsoft.com/office/powerpoint/2010/main">
-    <mc:Choice Requires="p14">
-      <p:transition spd="slow" p14:dur="800">
-        <p14:flythrough/>
+  <mc:AlternateContent xmlns:mc="http://schemas.openxmlformats.org/markup-compatibility/2006">
+    <mc:Choice xmlns:p14="http://schemas.microsoft.com/office/powerpoint/2010/main" Requires="p14">
+      <p:transition p14:dur="400">
+        <p:fade/>
       </p:transition>
     </mc:Choice>
-    <mc:Fallback xmlns="">
-      <p:transition spd="slow">
+    <mc:Fallback>
+      <p:transition>
         <p:fade/>
       </p:transition>
     </mc:Fallback>
@@ -9562,10 +9603,9 @@
               <a:buNone/>
             </a:pPr>
             <a:r>
-              <a:rPr lang="en-US" sz="3200" dirty="0" err="1" smtClean="0"/>
-              <a:t>AngularJS</a:t>
-            </a:r>
-            <a:endParaRPr lang="en-US" sz="3200" dirty="0" smtClean="0"/>
+              <a:rPr lang="en-US" sz="3200" dirty="0" smtClean="0"/>
+              <a:t>Service Director</a:t>
+            </a:r>
           </a:p>
           <a:p>
             <a:pPr marL="0" indent="0" algn="ctr">
@@ -9573,7 +9613,7 @@
             </a:pPr>
             <a:r>
               <a:rPr lang="en-US" sz="3200" dirty="0" smtClean="0"/>
-              <a:t>HTML/CSS</a:t>
+              <a:t>User Authentication</a:t>
             </a:r>
           </a:p>
           <a:p>
@@ -9582,14 +9622,8 @@
             </a:pPr>
             <a:r>
               <a:rPr lang="en-US" sz="3200" dirty="0" smtClean="0"/>
-              <a:t>Responsive</a:t>
-            </a:r>
-          </a:p>
-          <a:p>
-            <a:pPr marL="0" indent="0" algn="ctr">
-              <a:buNone/>
-            </a:pPr>
-            <a:endParaRPr lang="en-US" sz="3200" dirty="0" smtClean="0"/>
+              <a:t>Registration and Settings</a:t>
+            </a:r>
           </a:p>
         </p:txBody>
       </p:sp>
@@ -9618,7 +9652,7 @@
             <a:pPr algn="ctr"/>
             <a:r>
               <a:rPr lang="en-US" sz="6000" b="1" dirty="0" smtClean="0"/>
-              <a:t>Web-App</a:t>
+              <a:t>Accounts Application</a:t>
             </a:r>
           </a:p>
         </p:txBody>
@@ -9656,21 +9690,21 @@
     </p:spTree>
     <p:extLst>
       <p:ext uri="{BB962C8B-B14F-4D97-AF65-F5344CB8AC3E}">
-        <p14:creationId xmlns:p14="http://schemas.microsoft.com/office/powerpoint/2010/main" val="426489499"/>
+        <p14:creationId xmlns:p14="http://schemas.microsoft.com/office/powerpoint/2010/main" val="1358627340"/>
       </p:ext>
     </p:extLst>
   </p:cSld>
   <p:clrMapOvr>
     <a:masterClrMapping/>
   </p:clrMapOvr>
-  <mc:AlternateContent xmlns:mc="http://schemas.openxmlformats.org/markup-compatibility/2006" xmlns:p14="http://schemas.microsoft.com/office/powerpoint/2010/main">
-    <mc:Choice Requires="p14">
-      <p:transition spd="slow" p14:dur="800">
-        <p14:flythrough/>
+  <mc:AlternateContent xmlns:mc="http://schemas.openxmlformats.org/markup-compatibility/2006">
+    <mc:Choice xmlns:p14="http://schemas.microsoft.com/office/powerpoint/2010/main" Requires="p14">
+      <p:transition p14:dur="400">
+        <p:fade/>
       </p:transition>
     </mc:Choice>
-    <mc:Fallback xmlns="">
-      <p:transition spd="slow">
+    <mc:Fallback>
+      <p:transition>
         <p:fade/>
       </p:transition>
     </mc:Fallback>
@@ -9704,89 +9738,103 @@
       </p:grpSpPr>
       <p:sp>
         <p:nvSpPr>
-          <p:cNvPr id="2" name="Title 1"/>
-          <p:cNvSpPr>
-            <a:spLocks noGrp="1"/>
-          </p:cNvSpPr>
-          <p:nvPr>
-            <p:ph type="title"/>
-          </p:nvPr>
-        </p:nvSpPr>
-        <p:spPr>
-          <a:xfrm>
-            <a:off x="624115" y="2666999"/>
-            <a:ext cx="10878912" cy="1963190"/>
-          </a:xfrm>
-        </p:spPr>
-        <p:txBody>
-          <a:bodyPr>
+          <p:cNvPr id="3" name="Content Placeholder 2"/>
+          <p:cNvSpPr>
+            <a:spLocks noGrp="1"/>
+          </p:cNvSpPr>
+          <p:nvPr>
+            <p:ph idx="1"/>
+          </p:nvPr>
+        </p:nvSpPr>
+        <p:spPr>
+          <a:xfrm>
+            <a:off x="1785625" y="2156321"/>
+            <a:ext cx="10018713" cy="4528926"/>
+          </a:xfrm>
+        </p:spPr>
+        <p:txBody>
+          <a:bodyPr anchor="t">
             <a:normAutofit/>
           </a:bodyPr>
           <a:lstStyle/>
           <a:p>
-            <a:r>
-              <a:rPr lang="en-US" sz="6000" b="1" dirty="0" smtClean="0"/>
-              <a:t>What’s the current status of</a:t>
-            </a:r>
-            <a:r>
-              <a:rPr lang="en-US" sz="6000" b="1" dirty="0"/>
-              <a:t/>
-            </a:r>
-            <a:br>
-              <a:rPr lang="en-US" sz="6000" b="1" dirty="0"/>
-            </a:br>
-            <a:r>
-              <a:rPr lang="en-US" sz="6000" b="1" dirty="0" smtClean="0"/>
-              <a:t>                                  ?</a:t>
-            </a:r>
-            <a:endParaRPr lang="en-US" sz="6000" b="1" dirty="0"/>
-          </a:p>
-        </p:txBody>
-      </p:sp>
-      <p:sp>
-        <p:nvSpPr>
-          <p:cNvPr id="3" name="Text Placeholder 2"/>
-          <p:cNvSpPr>
-            <a:spLocks noGrp="1"/>
-          </p:cNvSpPr>
-          <p:nvPr>
-            <p:ph type="body" idx="1"/>
-          </p:nvPr>
-        </p:nvSpPr>
-        <p:spPr>
-          <a:xfrm>
-            <a:off x="2572278" y="4777380"/>
-            <a:ext cx="8930748" cy="1714859"/>
-          </a:xfrm>
-        </p:spPr>
-        <p:txBody>
-          <a:bodyPr>
-            <a:normAutofit/>
+            <a:pPr marL="0" indent="0" algn="ctr">
+              <a:buNone/>
+            </a:pPr>
+            <a:r>
+              <a:rPr lang="en-US" sz="3200" dirty="0" smtClean="0"/>
+              <a:t>Many Businesses Each</a:t>
+            </a:r>
+          </a:p>
+          <a:p>
+            <a:pPr marL="0" indent="0" algn="ctr">
+              <a:buNone/>
+            </a:pPr>
+            <a:r>
+              <a:rPr lang="en-US" sz="3200" dirty="0" smtClean="0"/>
+              <a:t>Employees &amp; Managers</a:t>
+            </a:r>
+          </a:p>
+          <a:p>
+            <a:pPr marL="0" indent="0" algn="ctr">
+              <a:buNone/>
+            </a:pPr>
+            <a:r>
+              <a:rPr lang="en-US" sz="3200" dirty="0" smtClean="0"/>
+              <a:t>Schedules</a:t>
+            </a:r>
+          </a:p>
+          <a:p>
+            <a:pPr marL="0" indent="0" algn="ctr">
+              <a:buNone/>
+            </a:pPr>
+            <a:r>
+              <a:rPr lang="en-US" sz="3200" dirty="0" smtClean="0"/>
+              <a:t>Messaging</a:t>
+            </a:r>
+          </a:p>
+        </p:txBody>
+      </p:sp>
+      <p:sp>
+        <p:nvSpPr>
+          <p:cNvPr id="2" name="TextBox 1"/>
+          <p:cNvSpPr txBox="1"/>
+          <p:nvPr/>
+        </p:nvSpPr>
+        <p:spPr>
+          <a:xfrm>
+            <a:off x="1397964" y="1014153"/>
+            <a:ext cx="10794036" cy="1015663"/>
+          </a:xfrm>
+          <a:prstGeom prst="rect">
+            <a:avLst/>
+          </a:prstGeom>
+          <a:noFill/>
+        </p:spPr>
+        <p:txBody>
+          <a:bodyPr wrap="square" rtlCol="0">
+            <a:spAutoFit/>
           </a:bodyPr>
           <a:lstStyle/>
           <a:p>
-            <a:r>
-              <a:rPr lang="en-US" sz="3200" dirty="0" smtClean="0"/>
-              <a:t>Our Progress </a:t>
-            </a:r>
-            <a:r>
-              <a:rPr lang="en-US" sz="3200" dirty="0" err="1" smtClean="0"/>
-              <a:t>Thusfar</a:t>
-            </a:r>
-            <a:endParaRPr lang="en-US" sz="3200" dirty="0"/>
+            <a:pPr algn="ctr"/>
+            <a:r>
+              <a:rPr lang="en-US" sz="6000" b="1" dirty="0" smtClean="0"/>
+              <a:t>Business Application</a:t>
+            </a:r>
           </a:p>
         </p:txBody>
       </p:sp>
       <p:pic>
         <p:nvPicPr>
-          <p:cNvPr id="5" name="Picture 4"/>
+          <p:cNvPr id="6" name="Picture 5"/>
           <p:cNvPicPr>
             <a:picLocks noChangeAspect="1"/>
           </p:cNvPicPr>
           <p:nvPr/>
         </p:nvPicPr>
         <p:blipFill>
-          <a:blip r:embed="rId2" cstate="print">
+          <a:blip r:embed="rId2">
             <a:extLst>
               <a:ext uri="{28A0092B-C50C-407E-A947-70E740481C1C}">
                 <a14:useLocalDpi xmlns:a14="http://schemas.microsoft.com/office/drawing/2010/main" val="0"/>
@@ -9799,8 +9847,8 @@
         </p:blipFill>
         <p:spPr>
           <a:xfrm>
-            <a:off x="5874484" y="3665910"/>
-            <a:ext cx="5114374" cy="1310975"/>
+            <a:off x="11505746" y="6174658"/>
+            <a:ext cx="686254" cy="686254"/>
           </a:xfrm>
           <a:prstGeom prst="rect">
             <a:avLst/>
@@ -9810,21 +9858,21 @@
     </p:spTree>
     <p:extLst>
       <p:ext uri="{BB962C8B-B14F-4D97-AF65-F5344CB8AC3E}">
-        <p14:creationId xmlns:p14="http://schemas.microsoft.com/office/powerpoint/2010/main" val="68431451"/>
+        <p14:creationId xmlns:p14="http://schemas.microsoft.com/office/powerpoint/2010/main" val="121259362"/>
       </p:ext>
     </p:extLst>
   </p:cSld>
   <p:clrMapOvr>
     <a:masterClrMapping/>
   </p:clrMapOvr>
-  <mc:AlternateContent xmlns:mc="http://schemas.openxmlformats.org/markup-compatibility/2006" xmlns:p14="http://schemas.microsoft.com/office/powerpoint/2010/main">
-    <mc:Choice Requires="p14">
-      <p:transition spd="slow" p14:dur="800">
-        <p14:flythrough/>
+  <mc:AlternateContent xmlns:mc="http://schemas.openxmlformats.org/markup-compatibility/2006">
+    <mc:Choice xmlns:p14="http://schemas.microsoft.com/office/powerpoint/2010/main" Requires="p14">
+      <p:transition p14:dur="400">
+        <p:fade/>
       </p:transition>
     </mc:Choice>
-    <mc:Fallback xmlns="">
-      <p:transition spd="slow">
+    <mc:Fallback>
+      <p:transition>
         <p:fade/>
       </p:transition>
     </mc:Fallback>
@@ -9858,85 +9906,98 @@
       </p:grpSpPr>
       <p:sp>
         <p:nvSpPr>
-          <p:cNvPr id="2" name="Title 1"/>
-          <p:cNvSpPr>
-            <a:spLocks noGrp="1"/>
-          </p:cNvSpPr>
-          <p:nvPr>
-            <p:ph type="title"/>
-          </p:nvPr>
-        </p:nvSpPr>
-        <p:spPr>
-          <a:xfrm>
-            <a:off x="1160207" y="2666999"/>
-            <a:ext cx="10342820" cy="1963190"/>
-          </a:xfrm>
-        </p:spPr>
-        <p:txBody>
-          <a:bodyPr>
+          <p:cNvPr id="3" name="Content Placeholder 2"/>
+          <p:cNvSpPr>
+            <a:spLocks noGrp="1"/>
+          </p:cNvSpPr>
+          <p:nvPr>
+            <p:ph idx="1"/>
+          </p:nvPr>
+        </p:nvSpPr>
+        <p:spPr>
+          <a:xfrm>
+            <a:off x="1785625" y="2156321"/>
+            <a:ext cx="10018713" cy="4528926"/>
+          </a:xfrm>
+        </p:spPr>
+        <p:txBody>
+          <a:bodyPr anchor="t">
             <a:normAutofit/>
           </a:bodyPr>
           <a:lstStyle/>
           <a:p>
-            <a:r>
-              <a:rPr lang="en-US" sz="6000" b="1" dirty="0" smtClean="0"/>
-              <a:t>What’s on the horizon for</a:t>
-            </a:r>
-            <a:r>
-              <a:rPr lang="en-US" sz="6000" b="1" dirty="0"/>
-              <a:t/>
-            </a:r>
-            <a:br>
-              <a:rPr lang="en-US" sz="6000" b="1" dirty="0"/>
-            </a:br>
-            <a:r>
-              <a:rPr lang="en-US" sz="6000" b="1" dirty="0" smtClean="0"/>
-              <a:t>                                  ?</a:t>
-            </a:r>
-            <a:endParaRPr lang="en-US" sz="6000" b="1" dirty="0"/>
-          </a:p>
-        </p:txBody>
-      </p:sp>
-      <p:sp>
-        <p:nvSpPr>
-          <p:cNvPr id="3" name="Text Placeholder 2"/>
-          <p:cNvSpPr>
-            <a:spLocks noGrp="1"/>
-          </p:cNvSpPr>
-          <p:nvPr>
-            <p:ph type="body" idx="1"/>
-          </p:nvPr>
-        </p:nvSpPr>
-        <p:spPr>
-          <a:xfrm>
-            <a:off x="2572278" y="4777380"/>
-            <a:ext cx="8930748" cy="1714859"/>
-          </a:xfrm>
-        </p:spPr>
-        <p:txBody>
-          <a:bodyPr>
-            <a:normAutofit/>
+            <a:pPr marL="0" indent="0" algn="ctr">
+              <a:buNone/>
+            </a:pPr>
+            <a:r>
+              <a:rPr lang="en-US" sz="3200" dirty="0" err="1" smtClean="0"/>
+              <a:t>Nexmo</a:t>
+            </a:r>
+            <a:r>
+              <a:rPr lang="en-US" sz="3200" dirty="0" smtClean="0"/>
+              <a:t> SMS Service</a:t>
+            </a:r>
+          </a:p>
+          <a:p>
+            <a:pPr marL="0" indent="0" algn="ctr">
+              <a:buNone/>
+            </a:pPr>
+            <a:r>
+              <a:rPr lang="en-US" sz="3200" dirty="0" smtClean="0"/>
+              <a:t>SMTP Mail Server</a:t>
+            </a:r>
+          </a:p>
+          <a:p>
+            <a:pPr marL="0" indent="0" algn="ctr">
+              <a:buNone/>
+            </a:pPr>
+            <a:r>
+              <a:rPr lang="en-US" sz="3200" dirty="0" smtClean="0"/>
+              <a:t>API for Application Alerts</a:t>
+            </a:r>
+          </a:p>
+        </p:txBody>
+      </p:sp>
+      <p:sp>
+        <p:nvSpPr>
+          <p:cNvPr id="2" name="TextBox 1"/>
+          <p:cNvSpPr txBox="1"/>
+          <p:nvPr/>
+        </p:nvSpPr>
+        <p:spPr>
+          <a:xfrm>
+            <a:off x="1397964" y="1014153"/>
+            <a:ext cx="10794036" cy="1015663"/>
+          </a:xfrm>
+          <a:prstGeom prst="rect">
+            <a:avLst/>
+          </a:prstGeom>
+          <a:noFill/>
+        </p:spPr>
+        <p:txBody>
+          <a:bodyPr wrap="square" rtlCol="0">
+            <a:spAutoFit/>
           </a:bodyPr>
           <a:lstStyle/>
           <a:p>
-            <a:r>
-              <a:rPr lang="en-US" sz="3200" dirty="0" smtClean="0"/>
-              <a:t>Future Enhancements</a:t>
-            </a:r>
-            <a:endParaRPr lang="en-US" sz="3200" dirty="0"/>
+            <a:pPr algn="ctr"/>
+            <a:r>
+              <a:rPr lang="en-US" sz="6000" b="1" dirty="0" smtClean="0"/>
+              <a:t>Notifications Application</a:t>
+            </a:r>
           </a:p>
         </p:txBody>
       </p:sp>
       <p:pic>
         <p:nvPicPr>
-          <p:cNvPr id="5" name="Picture 4"/>
+          <p:cNvPr id="6" name="Picture 5"/>
           <p:cNvPicPr>
             <a:picLocks noChangeAspect="1"/>
           </p:cNvPicPr>
           <p:nvPr/>
         </p:nvPicPr>
         <p:blipFill>
-          <a:blip r:embed="rId2" cstate="print">
+          <a:blip r:embed="rId2">
             <a:extLst>
               <a:ext uri="{28A0092B-C50C-407E-A947-70E740481C1C}">
                 <a14:useLocalDpi xmlns:a14="http://schemas.microsoft.com/office/drawing/2010/main" val="0"/>
@@ -9949,8 +10010,8 @@
         </p:blipFill>
         <p:spPr>
           <a:xfrm>
-            <a:off x="5874484" y="3665910"/>
-            <a:ext cx="5114374" cy="1310975"/>
+            <a:off x="11505746" y="6174658"/>
+            <a:ext cx="686254" cy="686254"/>
           </a:xfrm>
           <a:prstGeom prst="rect">
             <a:avLst/>
@@ -9960,21 +10021,21 @@
     </p:spTree>
     <p:extLst>
       <p:ext uri="{BB962C8B-B14F-4D97-AF65-F5344CB8AC3E}">
-        <p14:creationId xmlns:p14="http://schemas.microsoft.com/office/powerpoint/2010/main" val="4182098883"/>
+        <p14:creationId xmlns:p14="http://schemas.microsoft.com/office/powerpoint/2010/main" val="1968878506"/>
       </p:ext>
     </p:extLst>
   </p:cSld>
   <p:clrMapOvr>
     <a:masterClrMapping/>
   </p:clrMapOvr>
-  <mc:AlternateContent xmlns:mc="http://schemas.openxmlformats.org/markup-compatibility/2006" xmlns:p14="http://schemas.microsoft.com/office/powerpoint/2010/main">
-    <mc:Choice Requires="p14">
-      <p:transition spd="slow" p14:dur="800">
-        <p14:flythrough/>
+  <mc:AlternateContent xmlns:mc="http://schemas.openxmlformats.org/markup-compatibility/2006">
+    <mc:Choice xmlns:p14="http://schemas.microsoft.com/office/powerpoint/2010/main" Requires="p14">
+      <p:transition p14:dur="400">
+        <p:fade/>
       </p:transition>
     </mc:Choice>
-    <mc:Fallback xmlns="">
-      <p:transition spd="slow">
+    <mc:Fallback>
+      <p:transition>
         <p:fade/>
       </p:transition>
     </mc:Fallback>
@@ -10008,6 +10069,172 @@
       </p:grpSpPr>
       <p:sp>
         <p:nvSpPr>
+          <p:cNvPr id="3" name="Content Placeholder 2"/>
+          <p:cNvSpPr>
+            <a:spLocks noGrp="1"/>
+          </p:cNvSpPr>
+          <p:nvPr>
+            <p:ph idx="1"/>
+          </p:nvPr>
+        </p:nvSpPr>
+        <p:spPr>
+          <a:xfrm>
+            <a:off x="1785625" y="2156321"/>
+            <a:ext cx="10018713" cy="4528926"/>
+          </a:xfrm>
+        </p:spPr>
+        <p:txBody>
+          <a:bodyPr anchor="t">
+            <a:normAutofit/>
+          </a:bodyPr>
+          <a:lstStyle/>
+          <a:p>
+            <a:pPr marL="0" indent="0" algn="ctr">
+              <a:buNone/>
+            </a:pPr>
+            <a:r>
+              <a:rPr lang="en-US" sz="3200" dirty="0" err="1" smtClean="0"/>
+              <a:t>AngularJS</a:t>
+            </a:r>
+            <a:endParaRPr lang="en-US" sz="3200" dirty="0" smtClean="0"/>
+          </a:p>
+          <a:p>
+            <a:pPr marL="0" indent="0" algn="ctr">
+              <a:buNone/>
+            </a:pPr>
+            <a:r>
+              <a:rPr lang="en-US" sz="3200" dirty="0" smtClean="0"/>
+              <a:t>HTML/CSS</a:t>
+            </a:r>
+          </a:p>
+          <a:p>
+            <a:pPr marL="0" indent="0" algn="ctr">
+              <a:buNone/>
+            </a:pPr>
+            <a:r>
+              <a:rPr lang="en-US" sz="3200" dirty="0" smtClean="0"/>
+              <a:t>Responsive</a:t>
+            </a:r>
+          </a:p>
+          <a:p>
+            <a:pPr marL="0" indent="0" algn="ctr">
+              <a:buNone/>
+            </a:pPr>
+            <a:endParaRPr lang="en-US" sz="3200" dirty="0" smtClean="0"/>
+          </a:p>
+        </p:txBody>
+      </p:sp>
+      <p:sp>
+        <p:nvSpPr>
+          <p:cNvPr id="2" name="TextBox 1"/>
+          <p:cNvSpPr txBox="1"/>
+          <p:nvPr/>
+        </p:nvSpPr>
+        <p:spPr>
+          <a:xfrm>
+            <a:off x="1397964" y="1014153"/>
+            <a:ext cx="10794036" cy="1015663"/>
+          </a:xfrm>
+          <a:prstGeom prst="rect">
+            <a:avLst/>
+          </a:prstGeom>
+          <a:noFill/>
+        </p:spPr>
+        <p:txBody>
+          <a:bodyPr wrap="square" rtlCol="0">
+            <a:spAutoFit/>
+          </a:bodyPr>
+          <a:lstStyle/>
+          <a:p>
+            <a:pPr algn="ctr"/>
+            <a:r>
+              <a:rPr lang="en-US" sz="6000" b="1" dirty="0" smtClean="0"/>
+              <a:t>Web-App</a:t>
+            </a:r>
+          </a:p>
+        </p:txBody>
+      </p:sp>
+      <p:pic>
+        <p:nvPicPr>
+          <p:cNvPr id="6" name="Picture 5"/>
+          <p:cNvPicPr>
+            <a:picLocks noChangeAspect="1"/>
+          </p:cNvPicPr>
+          <p:nvPr/>
+        </p:nvPicPr>
+        <p:blipFill>
+          <a:blip r:embed="rId2">
+            <a:extLst>
+              <a:ext uri="{28A0092B-C50C-407E-A947-70E740481C1C}">
+                <a14:useLocalDpi xmlns:a14="http://schemas.microsoft.com/office/drawing/2010/main" val="0"/>
+              </a:ext>
+            </a:extLst>
+          </a:blip>
+          <a:stretch>
+            <a:fillRect/>
+          </a:stretch>
+        </p:blipFill>
+        <p:spPr>
+          <a:xfrm>
+            <a:off x="11505746" y="6174658"/>
+            <a:ext cx="686254" cy="686254"/>
+          </a:xfrm>
+          <a:prstGeom prst="rect">
+            <a:avLst/>
+          </a:prstGeom>
+        </p:spPr>
+      </p:pic>
+    </p:spTree>
+    <p:extLst>
+      <p:ext uri="{BB962C8B-B14F-4D97-AF65-F5344CB8AC3E}">
+        <p14:creationId xmlns:p14="http://schemas.microsoft.com/office/powerpoint/2010/main" val="426489499"/>
+      </p:ext>
+    </p:extLst>
+  </p:cSld>
+  <p:clrMapOvr>
+    <a:masterClrMapping/>
+  </p:clrMapOvr>
+  <mc:AlternateContent xmlns:mc="http://schemas.openxmlformats.org/markup-compatibility/2006">
+    <mc:Choice xmlns:p14="http://schemas.microsoft.com/office/powerpoint/2010/main" Requires="p14">
+      <p:transition p14:dur="400">
+        <p:fade/>
+      </p:transition>
+    </mc:Choice>
+    <mc:Fallback>
+      <p:transition>
+        <p:fade/>
+      </p:transition>
+    </mc:Fallback>
+  </mc:AlternateContent>
+  <p:timing>
+    <p:tnLst>
+      <p:par>
+        <p:cTn id="1" dur="indefinite" restart="never" nodeType="tmRoot"/>
+      </p:par>
+    </p:tnLst>
+  </p:timing>
+</p:sld>
+</file>
+
+<file path=ppt/slides/slide29.xml><?xml version="1.0" encoding="utf-8"?>
+<p:sld xmlns:a="http://schemas.openxmlformats.org/drawingml/2006/main" xmlns:r="http://schemas.openxmlformats.org/officeDocument/2006/relationships" xmlns:p="http://schemas.openxmlformats.org/presentationml/2006/main">
+  <p:cSld>
+    <p:spTree>
+      <p:nvGrpSpPr>
+        <p:cNvPr id="1" name=""/>
+        <p:cNvGrpSpPr/>
+        <p:nvPr/>
+      </p:nvGrpSpPr>
+      <p:grpSpPr>
+        <a:xfrm>
+          <a:off x="0" y="0"/>
+          <a:ext cx="0" cy="0"/>
+          <a:chOff x="0" y="0"/>
+          <a:chExt cx="0" cy="0"/>
+        </a:xfrm>
+      </p:grpSpPr>
+      <p:sp>
+        <p:nvSpPr>
           <p:cNvPr id="2" name="Title 1"/>
           <p:cNvSpPr>
             <a:spLocks noGrp="1"/>
@@ -10030,10 +10257,14 @@
           <a:p>
             <a:r>
               <a:rPr lang="en-US" sz="6000" b="1" dirty="0" smtClean="0"/>
-              <a:t>Have any questions about</a:t>
+              <a:t>What’s the current status of</a:t>
+            </a:r>
+            <a:r>
+              <a:rPr lang="en-US" sz="6000" b="1" dirty="0"/>
+              <a:t/>
             </a:r>
             <a:br>
-              <a:rPr lang="en-US" sz="6000" b="1" dirty="0" smtClean="0"/>
+              <a:rPr lang="en-US" sz="6000" b="1" dirty="0"/>
             </a:br>
             <a:r>
               <a:rPr lang="en-US" sz="6000" b="1" dirty="0" smtClean="0"/>
@@ -10067,7 +10298,11 @@
           <a:p>
             <a:r>
               <a:rPr lang="en-US" sz="3200" dirty="0" smtClean="0"/>
-              <a:t>Q &amp; A</a:t>
+              <a:t>Our Progress </a:t>
+            </a:r>
+            <a:r>
+              <a:rPr lang="en-US" sz="3200" dirty="0" err="1" smtClean="0"/>
+              <a:t>Thusfar</a:t>
             </a:r>
             <a:endParaRPr lang="en-US" sz="3200" dirty="0"/>
           </a:p>
@@ -10106,21 +10341,21 @@
     </p:spTree>
     <p:extLst>
       <p:ext uri="{BB962C8B-B14F-4D97-AF65-F5344CB8AC3E}">
-        <p14:creationId xmlns:p14="http://schemas.microsoft.com/office/powerpoint/2010/main" val="2273999013"/>
+        <p14:creationId xmlns:p14="http://schemas.microsoft.com/office/powerpoint/2010/main" val="68431451"/>
       </p:ext>
     </p:extLst>
   </p:cSld>
   <p:clrMapOvr>
     <a:masterClrMapping/>
   </p:clrMapOvr>
-  <mc:AlternateContent xmlns:mc="http://schemas.openxmlformats.org/markup-compatibility/2006" xmlns:p14="http://schemas.microsoft.com/office/powerpoint/2010/main">
-    <mc:Choice Requires="p14">
-      <p:transition spd="slow" p14:dur="800">
-        <p14:flythrough/>
+  <mc:AlternateContent xmlns:mc="http://schemas.openxmlformats.org/markup-compatibility/2006">
+    <mc:Choice xmlns:p14="http://schemas.microsoft.com/office/powerpoint/2010/main" Requires="p14">
+      <p:transition p14:dur="400">
+        <p:fade/>
       </p:transition>
     </mc:Choice>
-    <mc:Fallback xmlns="">
-      <p:transition spd="slow">
+    <mc:Fallback>
+      <p:transition>
         <p:fade/>
       </p:transition>
     </mc:Fallback>
@@ -10259,14 +10494,1148 @@
   <p:clrMapOvr>
     <a:masterClrMapping/>
   </p:clrMapOvr>
-  <mc:AlternateContent xmlns:mc="http://schemas.openxmlformats.org/markup-compatibility/2006" xmlns:p14="http://schemas.microsoft.com/office/powerpoint/2010/main">
-    <mc:Choice Requires="p14">
-      <p:transition spd="slow" p14:dur="800">
-        <p14:flythrough/>
+  <mc:AlternateContent xmlns:mc="http://schemas.openxmlformats.org/markup-compatibility/2006">
+    <mc:Choice xmlns:p14="http://schemas.microsoft.com/office/powerpoint/2010/main" Requires="p14">
+      <p:transition p14:dur="400">
+        <p:fade/>
       </p:transition>
     </mc:Choice>
-    <mc:Fallback xmlns="">
-      <p:transition spd="slow">
+    <mc:Fallback>
+      <p:transition>
+        <p:fade/>
+      </p:transition>
+    </mc:Fallback>
+  </mc:AlternateContent>
+  <p:timing>
+    <p:tnLst>
+      <p:par>
+        <p:cTn id="1" dur="indefinite" restart="never" nodeType="tmRoot"/>
+      </p:par>
+    </p:tnLst>
+  </p:timing>
+</p:sld>
+</file>
+
+<file path=ppt/slides/slide30.xml><?xml version="1.0" encoding="utf-8"?>
+<p:sld xmlns:a="http://schemas.openxmlformats.org/drawingml/2006/main" xmlns:r="http://schemas.openxmlformats.org/officeDocument/2006/relationships" xmlns:p="http://schemas.openxmlformats.org/presentationml/2006/main">
+  <p:cSld>
+    <p:spTree>
+      <p:nvGrpSpPr>
+        <p:cNvPr id="1" name=""/>
+        <p:cNvGrpSpPr/>
+        <p:nvPr/>
+      </p:nvGrpSpPr>
+      <p:grpSpPr>
+        <a:xfrm>
+          <a:off x="0" y="0"/>
+          <a:ext cx="0" cy="0"/>
+          <a:chOff x="0" y="0"/>
+          <a:chExt cx="0" cy="0"/>
+        </a:xfrm>
+      </p:grpSpPr>
+      <p:sp>
+        <p:nvSpPr>
+          <p:cNvPr id="3" name="Content Placeholder 2"/>
+          <p:cNvSpPr>
+            <a:spLocks noGrp="1"/>
+          </p:cNvSpPr>
+          <p:nvPr>
+            <p:ph idx="1"/>
+          </p:nvPr>
+        </p:nvSpPr>
+        <p:spPr>
+          <a:xfrm>
+            <a:off x="1785625" y="2156321"/>
+            <a:ext cx="10018713" cy="4528926"/>
+          </a:xfrm>
+        </p:spPr>
+        <p:txBody>
+          <a:bodyPr anchor="t">
+            <a:normAutofit/>
+          </a:bodyPr>
+          <a:lstStyle/>
+          <a:p>
+            <a:pPr marL="0" indent="0" algn="ctr">
+              <a:buNone/>
+            </a:pPr>
+            <a:endParaRPr lang="en-US" sz="3200" dirty="0" smtClean="0"/>
+          </a:p>
+          <a:p>
+            <a:pPr marL="0" indent="0" algn="ctr">
+              <a:buNone/>
+            </a:pPr>
+            <a:r>
+              <a:rPr lang="en-US" sz="3200" dirty="0" smtClean="0"/>
+              <a:t>Business</a:t>
+            </a:r>
+          </a:p>
+          <a:p>
+            <a:pPr marL="0" indent="0" algn="ctr">
+              <a:buNone/>
+            </a:pPr>
+            <a:r>
+              <a:rPr lang="en-US" sz="3200" dirty="0" smtClean="0"/>
+              <a:t>Accounts</a:t>
+            </a:r>
+            <a:endParaRPr lang="en-US" sz="3200" dirty="0" smtClean="0"/>
+          </a:p>
+          <a:p>
+            <a:pPr marL="0" indent="0" algn="ctr">
+              <a:buNone/>
+            </a:pPr>
+            <a:endParaRPr lang="en-US" sz="3200" dirty="0" smtClean="0"/>
+          </a:p>
+        </p:txBody>
+      </p:sp>
+      <p:sp>
+        <p:nvSpPr>
+          <p:cNvPr id="2" name="TextBox 1"/>
+          <p:cNvSpPr txBox="1"/>
+          <p:nvPr/>
+        </p:nvSpPr>
+        <p:spPr>
+          <a:xfrm>
+            <a:off x="1397964" y="1014153"/>
+            <a:ext cx="10794036" cy="1015663"/>
+          </a:xfrm>
+          <a:prstGeom prst="rect">
+            <a:avLst/>
+          </a:prstGeom>
+          <a:noFill/>
+        </p:spPr>
+        <p:txBody>
+          <a:bodyPr wrap="square" rtlCol="0">
+            <a:spAutoFit/>
+          </a:bodyPr>
+          <a:lstStyle/>
+          <a:p>
+            <a:pPr algn="ctr"/>
+            <a:r>
+              <a:rPr lang="en-US" sz="6000" b="1" dirty="0" smtClean="0"/>
+              <a:t>Database</a:t>
+            </a:r>
+            <a:endParaRPr lang="en-US" sz="6000" b="1" dirty="0" smtClean="0"/>
+          </a:p>
+        </p:txBody>
+      </p:sp>
+      <p:pic>
+        <p:nvPicPr>
+          <p:cNvPr id="6" name="Picture 5"/>
+          <p:cNvPicPr>
+            <a:picLocks noChangeAspect="1"/>
+          </p:cNvPicPr>
+          <p:nvPr/>
+        </p:nvPicPr>
+        <p:blipFill>
+          <a:blip r:embed="rId2">
+            <a:extLst>
+              <a:ext uri="{28A0092B-C50C-407E-A947-70E740481C1C}">
+                <a14:useLocalDpi xmlns:a14="http://schemas.microsoft.com/office/drawing/2010/main" val="0"/>
+              </a:ext>
+            </a:extLst>
+          </a:blip>
+          <a:stretch>
+            <a:fillRect/>
+          </a:stretch>
+        </p:blipFill>
+        <p:spPr>
+          <a:xfrm>
+            <a:off x="11505746" y="6174658"/>
+            <a:ext cx="686254" cy="686254"/>
+          </a:xfrm>
+          <a:prstGeom prst="rect">
+            <a:avLst/>
+          </a:prstGeom>
+        </p:spPr>
+      </p:pic>
+    </p:spTree>
+    <p:extLst>
+      <p:ext uri="{BB962C8B-B14F-4D97-AF65-F5344CB8AC3E}">
+        <p14:creationId xmlns:p14="http://schemas.microsoft.com/office/powerpoint/2010/main" val="2000156295"/>
+      </p:ext>
+    </p:extLst>
+  </p:cSld>
+  <p:clrMapOvr>
+    <a:masterClrMapping/>
+  </p:clrMapOvr>
+  <mc:AlternateContent xmlns:mc="http://schemas.openxmlformats.org/markup-compatibility/2006">
+    <mc:Choice xmlns:p14="http://schemas.microsoft.com/office/powerpoint/2010/main" Requires="p14">
+      <p:transition p14:dur="400">
+        <p:fade/>
+      </p:transition>
+    </mc:Choice>
+    <mc:Fallback>
+      <p:transition>
+        <p:fade/>
+      </p:transition>
+    </mc:Fallback>
+  </mc:AlternateContent>
+  <p:timing>
+    <p:tnLst>
+      <p:par>
+        <p:cTn id="1" dur="indefinite" restart="never" nodeType="tmRoot"/>
+      </p:par>
+    </p:tnLst>
+  </p:timing>
+</p:sld>
+</file>
+
+<file path=ppt/slides/slide31.xml><?xml version="1.0" encoding="utf-8"?>
+<p:sld xmlns:a="http://schemas.openxmlformats.org/drawingml/2006/main" xmlns:r="http://schemas.openxmlformats.org/officeDocument/2006/relationships" xmlns:p="http://schemas.openxmlformats.org/presentationml/2006/main">
+  <p:cSld>
+    <p:spTree>
+      <p:nvGrpSpPr>
+        <p:cNvPr id="1" name=""/>
+        <p:cNvGrpSpPr/>
+        <p:nvPr/>
+      </p:nvGrpSpPr>
+      <p:grpSpPr>
+        <a:xfrm>
+          <a:off x="0" y="0"/>
+          <a:ext cx="0" cy="0"/>
+          <a:chOff x="0" y="0"/>
+          <a:chExt cx="0" cy="0"/>
+        </a:xfrm>
+      </p:grpSpPr>
+      <p:sp>
+        <p:nvSpPr>
+          <p:cNvPr id="3" name="Content Placeholder 2"/>
+          <p:cNvSpPr>
+            <a:spLocks noGrp="1"/>
+          </p:cNvSpPr>
+          <p:nvPr>
+            <p:ph idx="1"/>
+          </p:nvPr>
+        </p:nvSpPr>
+        <p:spPr>
+          <a:xfrm>
+            <a:off x="1785625" y="2156321"/>
+            <a:ext cx="10018713" cy="4528926"/>
+          </a:xfrm>
+        </p:spPr>
+        <p:txBody>
+          <a:bodyPr anchor="t">
+            <a:normAutofit/>
+          </a:bodyPr>
+          <a:lstStyle/>
+          <a:p>
+            <a:pPr marL="0" indent="0" algn="ctr">
+              <a:buNone/>
+            </a:pPr>
+            <a:endParaRPr lang="en-US" sz="3200" dirty="0" smtClean="0"/>
+          </a:p>
+          <a:p>
+            <a:pPr marL="0" indent="0" algn="ctr">
+              <a:buNone/>
+            </a:pPr>
+            <a:r>
+              <a:rPr lang="en-US" sz="3200" dirty="0" smtClean="0"/>
+              <a:t>Eclipse</a:t>
+            </a:r>
+          </a:p>
+          <a:p>
+            <a:pPr marL="0" indent="0" algn="ctr">
+              <a:buNone/>
+            </a:pPr>
+            <a:r>
+              <a:rPr lang="en-US" sz="3200" dirty="0" smtClean="0"/>
+              <a:t>Ant</a:t>
+            </a:r>
+            <a:endParaRPr lang="en-US" sz="3200" dirty="0" smtClean="0"/>
+          </a:p>
+          <a:p>
+            <a:pPr marL="0" indent="0" algn="ctr">
+              <a:buNone/>
+            </a:pPr>
+            <a:endParaRPr lang="en-US" sz="3200" dirty="0" smtClean="0"/>
+          </a:p>
+        </p:txBody>
+      </p:sp>
+      <p:sp>
+        <p:nvSpPr>
+          <p:cNvPr id="2" name="TextBox 1"/>
+          <p:cNvSpPr txBox="1"/>
+          <p:nvPr/>
+        </p:nvSpPr>
+        <p:spPr>
+          <a:xfrm>
+            <a:off x="1397964" y="1014153"/>
+            <a:ext cx="10794036" cy="1015663"/>
+          </a:xfrm>
+          <a:prstGeom prst="rect">
+            <a:avLst/>
+          </a:prstGeom>
+          <a:noFill/>
+        </p:spPr>
+        <p:txBody>
+          <a:bodyPr wrap="square" rtlCol="0">
+            <a:spAutoFit/>
+          </a:bodyPr>
+          <a:lstStyle/>
+          <a:p>
+            <a:pPr algn="ctr"/>
+            <a:r>
+              <a:rPr lang="en-US" sz="6000" b="1" dirty="0" smtClean="0"/>
+              <a:t>Dev. </a:t>
+            </a:r>
+            <a:r>
+              <a:rPr lang="en-US" sz="6000" b="1" dirty="0"/>
+              <a:t>E</a:t>
+            </a:r>
+            <a:r>
+              <a:rPr lang="en-US" sz="6000" b="1" dirty="0" smtClean="0"/>
+              <a:t>nvironment</a:t>
+            </a:r>
+            <a:endParaRPr lang="en-US" sz="6000" b="1" dirty="0" smtClean="0"/>
+          </a:p>
+        </p:txBody>
+      </p:sp>
+      <p:pic>
+        <p:nvPicPr>
+          <p:cNvPr id="6" name="Picture 5"/>
+          <p:cNvPicPr>
+            <a:picLocks noChangeAspect="1"/>
+          </p:cNvPicPr>
+          <p:nvPr/>
+        </p:nvPicPr>
+        <p:blipFill>
+          <a:blip r:embed="rId2">
+            <a:extLst>
+              <a:ext uri="{28A0092B-C50C-407E-A947-70E740481C1C}">
+                <a14:useLocalDpi xmlns:a14="http://schemas.microsoft.com/office/drawing/2010/main" val="0"/>
+              </a:ext>
+            </a:extLst>
+          </a:blip>
+          <a:stretch>
+            <a:fillRect/>
+          </a:stretch>
+        </p:blipFill>
+        <p:spPr>
+          <a:xfrm>
+            <a:off x="11505746" y="6174658"/>
+            <a:ext cx="686254" cy="686254"/>
+          </a:xfrm>
+          <a:prstGeom prst="rect">
+            <a:avLst/>
+          </a:prstGeom>
+        </p:spPr>
+      </p:pic>
+    </p:spTree>
+    <p:extLst>
+      <p:ext uri="{BB962C8B-B14F-4D97-AF65-F5344CB8AC3E}">
+        <p14:creationId xmlns:p14="http://schemas.microsoft.com/office/powerpoint/2010/main" val="3480553251"/>
+      </p:ext>
+    </p:extLst>
+  </p:cSld>
+  <p:clrMapOvr>
+    <a:masterClrMapping/>
+  </p:clrMapOvr>
+  <mc:AlternateContent xmlns:mc="http://schemas.openxmlformats.org/markup-compatibility/2006">
+    <mc:Choice xmlns:p14="http://schemas.microsoft.com/office/powerpoint/2010/main" Requires="p14">
+      <p:transition p14:dur="400">
+        <p:fade/>
+      </p:transition>
+    </mc:Choice>
+    <mc:Fallback>
+      <p:transition>
+        <p:fade/>
+      </p:transition>
+    </mc:Fallback>
+  </mc:AlternateContent>
+  <p:timing>
+    <p:tnLst>
+      <p:par>
+        <p:cTn id="1" dur="indefinite" restart="never" nodeType="tmRoot"/>
+      </p:par>
+    </p:tnLst>
+  </p:timing>
+</p:sld>
+</file>
+
+<file path=ppt/slides/slide32.xml><?xml version="1.0" encoding="utf-8"?>
+<p:sld xmlns:a="http://schemas.openxmlformats.org/drawingml/2006/main" xmlns:r="http://schemas.openxmlformats.org/officeDocument/2006/relationships" xmlns:p="http://schemas.openxmlformats.org/presentationml/2006/main">
+  <p:cSld>
+    <p:spTree>
+      <p:nvGrpSpPr>
+        <p:cNvPr id="1" name=""/>
+        <p:cNvGrpSpPr/>
+        <p:nvPr/>
+      </p:nvGrpSpPr>
+      <p:grpSpPr>
+        <a:xfrm>
+          <a:off x="0" y="0"/>
+          <a:ext cx="0" cy="0"/>
+          <a:chOff x="0" y="0"/>
+          <a:chExt cx="0" cy="0"/>
+        </a:xfrm>
+      </p:grpSpPr>
+      <p:sp>
+        <p:nvSpPr>
+          <p:cNvPr id="3" name="Content Placeholder 2"/>
+          <p:cNvSpPr>
+            <a:spLocks noGrp="1"/>
+          </p:cNvSpPr>
+          <p:nvPr>
+            <p:ph idx="1"/>
+          </p:nvPr>
+        </p:nvSpPr>
+        <p:spPr>
+          <a:xfrm>
+            <a:off x="1785625" y="2156321"/>
+            <a:ext cx="10018713" cy="4528926"/>
+          </a:xfrm>
+        </p:spPr>
+        <p:txBody>
+          <a:bodyPr anchor="t">
+            <a:normAutofit/>
+          </a:bodyPr>
+          <a:lstStyle/>
+          <a:p>
+            <a:pPr marL="0" indent="0" algn="ctr">
+              <a:buNone/>
+            </a:pPr>
+            <a:endParaRPr lang="en-US" sz="3200" dirty="0" smtClean="0"/>
+          </a:p>
+          <a:p>
+            <a:pPr marL="0" indent="0" algn="ctr">
+              <a:buNone/>
+            </a:pPr>
+            <a:r>
+              <a:rPr lang="en-US" sz="3200" dirty="0" smtClean="0"/>
+              <a:t>Business</a:t>
+            </a:r>
+          </a:p>
+          <a:p>
+            <a:pPr marL="0" indent="0" algn="ctr">
+              <a:buNone/>
+            </a:pPr>
+            <a:r>
+              <a:rPr lang="en-US" sz="3200" dirty="0" smtClean="0"/>
+              <a:t>Accounts</a:t>
+            </a:r>
+            <a:endParaRPr lang="en-US" sz="3200" dirty="0" smtClean="0"/>
+          </a:p>
+          <a:p>
+            <a:pPr marL="0" indent="0" algn="ctr">
+              <a:buNone/>
+            </a:pPr>
+            <a:endParaRPr lang="en-US" sz="3200" dirty="0" smtClean="0"/>
+          </a:p>
+        </p:txBody>
+      </p:sp>
+      <p:sp>
+        <p:nvSpPr>
+          <p:cNvPr id="2" name="TextBox 1"/>
+          <p:cNvSpPr txBox="1"/>
+          <p:nvPr/>
+        </p:nvSpPr>
+        <p:spPr>
+          <a:xfrm>
+            <a:off x="1397964" y="1014153"/>
+            <a:ext cx="10794036" cy="1015663"/>
+          </a:xfrm>
+          <a:prstGeom prst="rect">
+            <a:avLst/>
+          </a:prstGeom>
+          <a:noFill/>
+        </p:spPr>
+        <p:txBody>
+          <a:bodyPr wrap="square" rtlCol="0">
+            <a:spAutoFit/>
+          </a:bodyPr>
+          <a:lstStyle/>
+          <a:p>
+            <a:pPr algn="ctr"/>
+            <a:r>
+              <a:rPr lang="en-US" sz="6000" b="1" dirty="0" smtClean="0"/>
+              <a:t>Tomcat Structure</a:t>
+            </a:r>
+            <a:endParaRPr lang="en-US" sz="6000" b="1" dirty="0" smtClean="0"/>
+          </a:p>
+        </p:txBody>
+      </p:sp>
+      <p:pic>
+        <p:nvPicPr>
+          <p:cNvPr id="6" name="Picture 5"/>
+          <p:cNvPicPr>
+            <a:picLocks noChangeAspect="1"/>
+          </p:cNvPicPr>
+          <p:nvPr/>
+        </p:nvPicPr>
+        <p:blipFill>
+          <a:blip r:embed="rId2">
+            <a:extLst>
+              <a:ext uri="{28A0092B-C50C-407E-A947-70E740481C1C}">
+                <a14:useLocalDpi xmlns:a14="http://schemas.microsoft.com/office/drawing/2010/main" val="0"/>
+              </a:ext>
+            </a:extLst>
+          </a:blip>
+          <a:stretch>
+            <a:fillRect/>
+          </a:stretch>
+        </p:blipFill>
+        <p:spPr>
+          <a:xfrm>
+            <a:off x="11505746" y="6174658"/>
+            <a:ext cx="686254" cy="686254"/>
+          </a:xfrm>
+          <a:prstGeom prst="rect">
+            <a:avLst/>
+          </a:prstGeom>
+        </p:spPr>
+      </p:pic>
+    </p:spTree>
+    <p:extLst>
+      <p:ext uri="{BB962C8B-B14F-4D97-AF65-F5344CB8AC3E}">
+        <p14:creationId xmlns:p14="http://schemas.microsoft.com/office/powerpoint/2010/main" val="3290275354"/>
+      </p:ext>
+    </p:extLst>
+  </p:cSld>
+  <p:clrMapOvr>
+    <a:masterClrMapping/>
+  </p:clrMapOvr>
+  <mc:AlternateContent xmlns:mc="http://schemas.openxmlformats.org/markup-compatibility/2006">
+    <mc:Choice xmlns:p14="http://schemas.microsoft.com/office/powerpoint/2010/main" Requires="p14">
+      <p:transition p14:dur="400">
+        <p:fade/>
+      </p:transition>
+    </mc:Choice>
+    <mc:Fallback>
+      <p:transition>
+        <p:fade/>
+      </p:transition>
+    </mc:Fallback>
+  </mc:AlternateContent>
+  <p:timing>
+    <p:tnLst>
+      <p:par>
+        <p:cTn id="1" dur="indefinite" restart="never" nodeType="tmRoot"/>
+      </p:par>
+    </p:tnLst>
+  </p:timing>
+</p:sld>
+</file>
+
+<file path=ppt/slides/slide33.xml><?xml version="1.0" encoding="utf-8"?>
+<p:sld xmlns:a="http://schemas.openxmlformats.org/drawingml/2006/main" xmlns:r="http://schemas.openxmlformats.org/officeDocument/2006/relationships" xmlns:p="http://schemas.openxmlformats.org/presentationml/2006/main">
+  <p:cSld>
+    <p:spTree>
+      <p:nvGrpSpPr>
+        <p:cNvPr id="1" name=""/>
+        <p:cNvGrpSpPr/>
+        <p:nvPr/>
+      </p:nvGrpSpPr>
+      <p:grpSpPr>
+        <a:xfrm>
+          <a:off x="0" y="0"/>
+          <a:ext cx="0" cy="0"/>
+          <a:chOff x="0" y="0"/>
+          <a:chExt cx="0" cy="0"/>
+        </a:xfrm>
+      </p:grpSpPr>
+      <p:sp>
+        <p:nvSpPr>
+          <p:cNvPr id="3" name="Content Placeholder 2"/>
+          <p:cNvSpPr>
+            <a:spLocks noGrp="1"/>
+          </p:cNvSpPr>
+          <p:nvPr>
+            <p:ph idx="1"/>
+          </p:nvPr>
+        </p:nvSpPr>
+        <p:spPr>
+          <a:xfrm>
+            <a:off x="1785625" y="2156321"/>
+            <a:ext cx="10018713" cy="4528926"/>
+          </a:xfrm>
+        </p:spPr>
+        <p:txBody>
+          <a:bodyPr anchor="t">
+            <a:normAutofit/>
+          </a:bodyPr>
+          <a:lstStyle/>
+          <a:p>
+            <a:pPr marL="0" indent="0" algn="ctr">
+              <a:buNone/>
+            </a:pPr>
+            <a:endParaRPr lang="en-US" sz="3200" dirty="0" smtClean="0"/>
+          </a:p>
+          <a:p>
+            <a:pPr marL="0" indent="0" algn="ctr">
+              <a:buNone/>
+            </a:pPr>
+            <a:r>
+              <a:rPr lang="en-US" sz="3200" dirty="0" smtClean="0"/>
+              <a:t>Sessions</a:t>
+            </a:r>
+          </a:p>
+          <a:p>
+            <a:pPr marL="0" indent="0" algn="ctr">
+              <a:buNone/>
+            </a:pPr>
+            <a:r>
+              <a:rPr lang="en-US" sz="3200" dirty="0" smtClean="0"/>
+              <a:t>User Management</a:t>
+            </a:r>
+            <a:endParaRPr lang="en-US" sz="3200" dirty="0" smtClean="0"/>
+          </a:p>
+          <a:p>
+            <a:pPr marL="0" indent="0" algn="ctr">
+              <a:buNone/>
+            </a:pPr>
+            <a:endParaRPr lang="en-US" sz="3200" dirty="0" smtClean="0"/>
+          </a:p>
+        </p:txBody>
+      </p:sp>
+      <p:sp>
+        <p:nvSpPr>
+          <p:cNvPr id="2" name="TextBox 1"/>
+          <p:cNvSpPr txBox="1"/>
+          <p:nvPr/>
+        </p:nvSpPr>
+        <p:spPr>
+          <a:xfrm>
+            <a:off x="1397964" y="1014153"/>
+            <a:ext cx="10794036" cy="1015663"/>
+          </a:xfrm>
+          <a:prstGeom prst="rect">
+            <a:avLst/>
+          </a:prstGeom>
+          <a:noFill/>
+        </p:spPr>
+        <p:txBody>
+          <a:bodyPr wrap="square" rtlCol="0">
+            <a:spAutoFit/>
+          </a:bodyPr>
+          <a:lstStyle/>
+          <a:p>
+            <a:pPr algn="ctr"/>
+            <a:r>
+              <a:rPr lang="en-US" sz="6000" b="1" dirty="0" smtClean="0"/>
+              <a:t>Accounts API</a:t>
+            </a:r>
+            <a:endParaRPr lang="en-US" sz="6000" b="1" dirty="0" smtClean="0"/>
+          </a:p>
+        </p:txBody>
+      </p:sp>
+      <p:pic>
+        <p:nvPicPr>
+          <p:cNvPr id="6" name="Picture 5"/>
+          <p:cNvPicPr>
+            <a:picLocks noChangeAspect="1"/>
+          </p:cNvPicPr>
+          <p:nvPr/>
+        </p:nvPicPr>
+        <p:blipFill>
+          <a:blip r:embed="rId2">
+            <a:extLst>
+              <a:ext uri="{28A0092B-C50C-407E-A947-70E740481C1C}">
+                <a14:useLocalDpi xmlns:a14="http://schemas.microsoft.com/office/drawing/2010/main" val="0"/>
+              </a:ext>
+            </a:extLst>
+          </a:blip>
+          <a:stretch>
+            <a:fillRect/>
+          </a:stretch>
+        </p:blipFill>
+        <p:spPr>
+          <a:xfrm>
+            <a:off x="11505746" y="6174658"/>
+            <a:ext cx="686254" cy="686254"/>
+          </a:xfrm>
+          <a:prstGeom prst="rect">
+            <a:avLst/>
+          </a:prstGeom>
+        </p:spPr>
+      </p:pic>
+    </p:spTree>
+    <p:extLst>
+      <p:ext uri="{BB962C8B-B14F-4D97-AF65-F5344CB8AC3E}">
+        <p14:creationId xmlns:p14="http://schemas.microsoft.com/office/powerpoint/2010/main" val="2397708863"/>
+      </p:ext>
+    </p:extLst>
+  </p:cSld>
+  <p:clrMapOvr>
+    <a:masterClrMapping/>
+  </p:clrMapOvr>
+  <mc:AlternateContent xmlns:mc="http://schemas.openxmlformats.org/markup-compatibility/2006">
+    <mc:Choice xmlns:p14="http://schemas.microsoft.com/office/powerpoint/2010/main" Requires="p14">
+      <p:transition p14:dur="400">
+        <p:fade/>
+      </p:transition>
+    </mc:Choice>
+    <mc:Fallback>
+      <p:transition>
+        <p:fade/>
+      </p:transition>
+    </mc:Fallback>
+  </mc:AlternateContent>
+  <p:timing>
+    <p:tnLst>
+      <p:par>
+        <p:cTn id="1" dur="indefinite" restart="never" nodeType="tmRoot"/>
+      </p:par>
+    </p:tnLst>
+  </p:timing>
+</p:sld>
+</file>
+
+<file path=ppt/slides/slide34.xml><?xml version="1.0" encoding="utf-8"?>
+<p:sld xmlns:a="http://schemas.openxmlformats.org/drawingml/2006/main" xmlns:r="http://schemas.openxmlformats.org/officeDocument/2006/relationships" xmlns:p="http://schemas.openxmlformats.org/presentationml/2006/main">
+  <p:cSld>
+    <p:spTree>
+      <p:nvGrpSpPr>
+        <p:cNvPr id="1" name=""/>
+        <p:cNvGrpSpPr/>
+        <p:nvPr/>
+      </p:nvGrpSpPr>
+      <p:grpSpPr>
+        <a:xfrm>
+          <a:off x="0" y="0"/>
+          <a:ext cx="0" cy="0"/>
+          <a:chOff x="0" y="0"/>
+          <a:chExt cx="0" cy="0"/>
+        </a:xfrm>
+      </p:grpSpPr>
+      <p:sp>
+        <p:nvSpPr>
+          <p:cNvPr id="3" name="Content Placeholder 2"/>
+          <p:cNvSpPr>
+            <a:spLocks noGrp="1"/>
+          </p:cNvSpPr>
+          <p:nvPr>
+            <p:ph idx="1"/>
+          </p:nvPr>
+        </p:nvSpPr>
+        <p:spPr>
+          <a:xfrm>
+            <a:off x="1785625" y="2156321"/>
+            <a:ext cx="10018713" cy="4528926"/>
+          </a:xfrm>
+        </p:spPr>
+        <p:txBody>
+          <a:bodyPr anchor="t">
+            <a:normAutofit/>
+          </a:bodyPr>
+          <a:lstStyle/>
+          <a:p>
+            <a:pPr marL="0" indent="0" algn="ctr">
+              <a:buNone/>
+            </a:pPr>
+            <a:endParaRPr lang="en-US" sz="3200" dirty="0" smtClean="0"/>
+          </a:p>
+          <a:p>
+            <a:pPr marL="0" indent="0" algn="ctr">
+              <a:buNone/>
+            </a:pPr>
+            <a:endParaRPr lang="en-US" sz="3200" dirty="0" smtClean="0"/>
+          </a:p>
+        </p:txBody>
+      </p:sp>
+      <p:sp>
+        <p:nvSpPr>
+          <p:cNvPr id="2" name="TextBox 1"/>
+          <p:cNvSpPr txBox="1"/>
+          <p:nvPr/>
+        </p:nvSpPr>
+        <p:spPr>
+          <a:xfrm>
+            <a:off x="1397964" y="340822"/>
+            <a:ext cx="10794036" cy="1015663"/>
+          </a:xfrm>
+          <a:prstGeom prst="rect">
+            <a:avLst/>
+          </a:prstGeom>
+          <a:noFill/>
+        </p:spPr>
+        <p:txBody>
+          <a:bodyPr wrap="square" rtlCol="0">
+            <a:spAutoFit/>
+          </a:bodyPr>
+          <a:lstStyle/>
+          <a:p>
+            <a:pPr algn="ctr"/>
+            <a:r>
+              <a:rPr lang="en-US" sz="6000" b="1" dirty="0" smtClean="0"/>
+              <a:t>Web-App</a:t>
+            </a:r>
+          </a:p>
+        </p:txBody>
+      </p:sp>
+      <p:pic>
+        <p:nvPicPr>
+          <p:cNvPr id="6" name="Picture 5"/>
+          <p:cNvPicPr>
+            <a:picLocks noChangeAspect="1"/>
+          </p:cNvPicPr>
+          <p:nvPr/>
+        </p:nvPicPr>
+        <p:blipFill>
+          <a:blip r:embed="rId2">
+            <a:extLst>
+              <a:ext uri="{28A0092B-C50C-407E-A947-70E740481C1C}">
+                <a14:useLocalDpi xmlns:a14="http://schemas.microsoft.com/office/drawing/2010/main" val="0"/>
+              </a:ext>
+            </a:extLst>
+          </a:blip>
+          <a:stretch>
+            <a:fillRect/>
+          </a:stretch>
+        </p:blipFill>
+        <p:spPr>
+          <a:xfrm>
+            <a:off x="11505746" y="6174658"/>
+            <a:ext cx="686254" cy="686254"/>
+          </a:xfrm>
+          <a:prstGeom prst="rect">
+            <a:avLst/>
+          </a:prstGeom>
+        </p:spPr>
+      </p:pic>
+      <p:pic>
+        <p:nvPicPr>
+          <p:cNvPr id="4" name="Picture 3"/>
+          <p:cNvPicPr>
+            <a:picLocks noChangeAspect="1"/>
+          </p:cNvPicPr>
+          <p:nvPr/>
+        </p:nvPicPr>
+        <p:blipFill>
+          <a:blip r:embed="rId3">
+            <a:extLst>
+              <a:ext uri="{28A0092B-C50C-407E-A947-70E740481C1C}">
+                <a14:useLocalDpi xmlns:a14="http://schemas.microsoft.com/office/drawing/2010/main" val="0"/>
+              </a:ext>
+            </a:extLst>
+          </a:blip>
+          <a:stretch>
+            <a:fillRect/>
+          </a:stretch>
+        </p:blipFill>
+        <p:spPr>
+          <a:xfrm>
+            <a:off x="2709949" y="1534392"/>
+            <a:ext cx="8306798" cy="4932910"/>
+          </a:xfrm>
+          <a:prstGeom prst="rect">
+            <a:avLst/>
+          </a:prstGeom>
+        </p:spPr>
+      </p:pic>
+    </p:spTree>
+    <p:extLst>
+      <p:ext uri="{BB962C8B-B14F-4D97-AF65-F5344CB8AC3E}">
+        <p14:creationId xmlns:p14="http://schemas.microsoft.com/office/powerpoint/2010/main" val="2559189162"/>
+      </p:ext>
+    </p:extLst>
+  </p:cSld>
+  <p:clrMapOvr>
+    <a:masterClrMapping/>
+  </p:clrMapOvr>
+  <mc:AlternateContent xmlns:mc="http://schemas.openxmlformats.org/markup-compatibility/2006">
+    <mc:Choice xmlns:p14="http://schemas.microsoft.com/office/powerpoint/2010/main" Requires="p14">
+      <p:transition p14:dur="400">
+        <p:fade/>
+      </p:transition>
+    </mc:Choice>
+    <mc:Fallback>
+      <p:transition>
+        <p:fade/>
+      </p:transition>
+    </mc:Fallback>
+  </mc:AlternateContent>
+  <p:timing>
+    <p:tnLst>
+      <p:par>
+        <p:cTn id="1" dur="indefinite" restart="never" nodeType="tmRoot"/>
+      </p:par>
+    </p:tnLst>
+  </p:timing>
+</p:sld>
+</file>
+
+<file path=ppt/slides/slide35.xml><?xml version="1.0" encoding="utf-8"?>
+<p:sld xmlns:a="http://schemas.openxmlformats.org/drawingml/2006/main" xmlns:r="http://schemas.openxmlformats.org/officeDocument/2006/relationships" xmlns:p="http://schemas.openxmlformats.org/presentationml/2006/main">
+  <p:cSld>
+    <p:spTree>
+      <p:nvGrpSpPr>
+        <p:cNvPr id="1" name=""/>
+        <p:cNvGrpSpPr/>
+        <p:nvPr/>
+      </p:nvGrpSpPr>
+      <p:grpSpPr>
+        <a:xfrm>
+          <a:off x="0" y="0"/>
+          <a:ext cx="0" cy="0"/>
+          <a:chOff x="0" y="0"/>
+          <a:chExt cx="0" cy="0"/>
+        </a:xfrm>
+      </p:grpSpPr>
+      <p:sp>
+        <p:nvSpPr>
+          <p:cNvPr id="2" name="Title 1"/>
+          <p:cNvSpPr>
+            <a:spLocks noGrp="1"/>
+          </p:cNvSpPr>
+          <p:nvPr>
+            <p:ph type="title"/>
+          </p:nvPr>
+        </p:nvSpPr>
+        <p:spPr>
+          <a:xfrm>
+            <a:off x="1160207" y="2666999"/>
+            <a:ext cx="10342820" cy="1963190"/>
+          </a:xfrm>
+        </p:spPr>
+        <p:txBody>
+          <a:bodyPr>
+            <a:normAutofit/>
+          </a:bodyPr>
+          <a:lstStyle/>
+          <a:p>
+            <a:r>
+              <a:rPr lang="en-US" sz="6000" b="1" dirty="0" smtClean="0"/>
+              <a:t>What’s on the horizon for</a:t>
+            </a:r>
+            <a:r>
+              <a:rPr lang="en-US" sz="6000" b="1" dirty="0"/>
+              <a:t/>
+            </a:r>
+            <a:br>
+              <a:rPr lang="en-US" sz="6000" b="1" dirty="0"/>
+            </a:br>
+            <a:r>
+              <a:rPr lang="en-US" sz="6000" b="1" dirty="0" smtClean="0"/>
+              <a:t>                                  ?</a:t>
+            </a:r>
+            <a:endParaRPr lang="en-US" sz="6000" b="1" dirty="0"/>
+          </a:p>
+        </p:txBody>
+      </p:sp>
+      <p:sp>
+        <p:nvSpPr>
+          <p:cNvPr id="3" name="Text Placeholder 2"/>
+          <p:cNvSpPr>
+            <a:spLocks noGrp="1"/>
+          </p:cNvSpPr>
+          <p:nvPr>
+            <p:ph type="body" idx="1"/>
+          </p:nvPr>
+        </p:nvSpPr>
+        <p:spPr>
+          <a:xfrm>
+            <a:off x="2572278" y="4777380"/>
+            <a:ext cx="8930748" cy="1714859"/>
+          </a:xfrm>
+        </p:spPr>
+        <p:txBody>
+          <a:bodyPr>
+            <a:normAutofit/>
+          </a:bodyPr>
+          <a:lstStyle/>
+          <a:p>
+            <a:r>
+              <a:rPr lang="en-US" sz="3200" dirty="0" smtClean="0"/>
+              <a:t>Target Functionality</a:t>
+            </a:r>
+            <a:endParaRPr lang="en-US" sz="3200" dirty="0"/>
+          </a:p>
+        </p:txBody>
+      </p:sp>
+      <p:pic>
+        <p:nvPicPr>
+          <p:cNvPr id="5" name="Picture 4"/>
+          <p:cNvPicPr>
+            <a:picLocks noChangeAspect="1"/>
+          </p:cNvPicPr>
+          <p:nvPr/>
+        </p:nvPicPr>
+        <p:blipFill>
+          <a:blip r:embed="rId2" cstate="print">
+            <a:extLst>
+              <a:ext uri="{28A0092B-C50C-407E-A947-70E740481C1C}">
+                <a14:useLocalDpi xmlns:a14="http://schemas.microsoft.com/office/drawing/2010/main" val="0"/>
+              </a:ext>
+            </a:extLst>
+          </a:blip>
+          <a:stretch>
+            <a:fillRect/>
+          </a:stretch>
+        </p:blipFill>
+        <p:spPr>
+          <a:xfrm>
+            <a:off x="5874484" y="3665910"/>
+            <a:ext cx="5114374" cy="1310975"/>
+          </a:xfrm>
+          <a:prstGeom prst="rect">
+            <a:avLst/>
+          </a:prstGeom>
+        </p:spPr>
+      </p:pic>
+    </p:spTree>
+    <p:extLst>
+      <p:ext uri="{BB962C8B-B14F-4D97-AF65-F5344CB8AC3E}">
+        <p14:creationId xmlns:p14="http://schemas.microsoft.com/office/powerpoint/2010/main" val="4182098883"/>
+      </p:ext>
+    </p:extLst>
+  </p:cSld>
+  <p:clrMapOvr>
+    <a:masterClrMapping/>
+  </p:clrMapOvr>
+  <mc:AlternateContent xmlns:mc="http://schemas.openxmlformats.org/markup-compatibility/2006">
+    <mc:Choice xmlns:p14="http://schemas.microsoft.com/office/powerpoint/2010/main" Requires="p14">
+      <p:transition p14:dur="400">
+        <p:fade/>
+      </p:transition>
+    </mc:Choice>
+    <mc:Fallback>
+      <p:transition>
+        <p:fade/>
+      </p:transition>
+    </mc:Fallback>
+  </mc:AlternateContent>
+  <p:timing>
+    <p:tnLst>
+      <p:par>
+        <p:cTn id="1" dur="indefinite" restart="never" nodeType="tmRoot"/>
+      </p:par>
+    </p:tnLst>
+  </p:timing>
+</p:sld>
+</file>
+
+<file path=ppt/slides/slide36.xml><?xml version="1.0" encoding="utf-8"?>
+<p:sld xmlns:a="http://schemas.openxmlformats.org/drawingml/2006/main" xmlns:r="http://schemas.openxmlformats.org/officeDocument/2006/relationships" xmlns:p="http://schemas.openxmlformats.org/presentationml/2006/main">
+  <p:cSld>
+    <p:spTree>
+      <p:nvGrpSpPr>
+        <p:cNvPr id="1" name=""/>
+        <p:cNvGrpSpPr/>
+        <p:nvPr/>
+      </p:nvGrpSpPr>
+      <p:grpSpPr>
+        <a:xfrm>
+          <a:off x="0" y="0"/>
+          <a:ext cx="0" cy="0"/>
+          <a:chOff x="0" y="0"/>
+          <a:chExt cx="0" cy="0"/>
+        </a:xfrm>
+      </p:grpSpPr>
+      <p:sp>
+        <p:nvSpPr>
+          <p:cNvPr id="2" name="Title 1"/>
+          <p:cNvSpPr>
+            <a:spLocks noGrp="1"/>
+          </p:cNvSpPr>
+          <p:nvPr>
+            <p:ph type="title"/>
+          </p:nvPr>
+        </p:nvSpPr>
+        <p:spPr>
+          <a:xfrm>
+            <a:off x="624115" y="2666999"/>
+            <a:ext cx="10878912" cy="1963190"/>
+          </a:xfrm>
+        </p:spPr>
+        <p:txBody>
+          <a:bodyPr>
+            <a:normAutofit/>
+          </a:bodyPr>
+          <a:lstStyle/>
+          <a:p>
+            <a:r>
+              <a:rPr lang="en-US" sz="6000" b="1" dirty="0" smtClean="0"/>
+              <a:t>Have any questions about</a:t>
+            </a:r>
+            <a:br>
+              <a:rPr lang="en-US" sz="6000" b="1" dirty="0" smtClean="0"/>
+            </a:br>
+            <a:r>
+              <a:rPr lang="en-US" sz="6000" b="1" dirty="0" smtClean="0"/>
+              <a:t>                                  ?</a:t>
+            </a:r>
+            <a:endParaRPr lang="en-US" sz="6000" b="1" dirty="0"/>
+          </a:p>
+        </p:txBody>
+      </p:sp>
+      <p:sp>
+        <p:nvSpPr>
+          <p:cNvPr id="3" name="Text Placeholder 2"/>
+          <p:cNvSpPr>
+            <a:spLocks noGrp="1"/>
+          </p:cNvSpPr>
+          <p:nvPr>
+            <p:ph type="body" idx="1"/>
+          </p:nvPr>
+        </p:nvSpPr>
+        <p:spPr>
+          <a:xfrm>
+            <a:off x="2572278" y="4777380"/>
+            <a:ext cx="8930748" cy="1714859"/>
+          </a:xfrm>
+        </p:spPr>
+        <p:txBody>
+          <a:bodyPr>
+            <a:normAutofit/>
+          </a:bodyPr>
+          <a:lstStyle/>
+          <a:p>
+            <a:r>
+              <a:rPr lang="en-US" sz="3200" dirty="0" smtClean="0"/>
+              <a:t>Q &amp; A</a:t>
+            </a:r>
+            <a:endParaRPr lang="en-US" sz="3200" dirty="0"/>
+          </a:p>
+        </p:txBody>
+      </p:sp>
+      <p:pic>
+        <p:nvPicPr>
+          <p:cNvPr id="5" name="Picture 4"/>
+          <p:cNvPicPr>
+            <a:picLocks noChangeAspect="1"/>
+          </p:cNvPicPr>
+          <p:nvPr/>
+        </p:nvPicPr>
+        <p:blipFill>
+          <a:blip r:embed="rId2" cstate="print">
+            <a:extLst>
+              <a:ext uri="{28A0092B-C50C-407E-A947-70E740481C1C}">
+                <a14:useLocalDpi xmlns:a14="http://schemas.microsoft.com/office/drawing/2010/main" val="0"/>
+              </a:ext>
+            </a:extLst>
+          </a:blip>
+          <a:stretch>
+            <a:fillRect/>
+          </a:stretch>
+        </p:blipFill>
+        <p:spPr>
+          <a:xfrm>
+            <a:off x="5874484" y="3665910"/>
+            <a:ext cx="5114374" cy="1310975"/>
+          </a:xfrm>
+          <a:prstGeom prst="rect">
+            <a:avLst/>
+          </a:prstGeom>
+        </p:spPr>
+      </p:pic>
+    </p:spTree>
+    <p:extLst>
+      <p:ext uri="{BB962C8B-B14F-4D97-AF65-F5344CB8AC3E}">
+        <p14:creationId xmlns:p14="http://schemas.microsoft.com/office/powerpoint/2010/main" val="2273999013"/>
+      </p:ext>
+    </p:extLst>
+  </p:cSld>
+  <p:clrMapOvr>
+    <a:masterClrMapping/>
+  </p:clrMapOvr>
+  <mc:AlternateContent xmlns:mc="http://schemas.openxmlformats.org/markup-compatibility/2006">
+    <mc:Choice xmlns:p14="http://schemas.microsoft.com/office/powerpoint/2010/main" Requires="p14">
+      <p:transition p14:dur="400">
+        <p:fade/>
+      </p:transition>
+    </mc:Choice>
+    <mc:Fallback>
+      <p:transition>
         <p:fade/>
       </p:transition>
     </mc:Fallback>
@@ -10430,14 +11799,14 @@
   <p:clrMapOvr>
     <a:masterClrMapping/>
   </p:clrMapOvr>
-  <mc:AlternateContent xmlns:mc="http://schemas.openxmlformats.org/markup-compatibility/2006" xmlns:p14="http://schemas.microsoft.com/office/powerpoint/2010/main">
-    <mc:Choice Requires="p14">
-      <p:transition spd="slow" p14:dur="800">
-        <p14:flythrough/>
+  <mc:AlternateContent xmlns:mc="http://schemas.openxmlformats.org/markup-compatibility/2006">
+    <mc:Choice xmlns:p14="http://schemas.microsoft.com/office/powerpoint/2010/main" Requires="p14">
+      <p:transition p14:dur="400">
+        <p:fade/>
       </p:transition>
     </mc:Choice>
-    <mc:Fallback xmlns="">
-      <p:transition spd="slow">
+    <mc:Fallback>
+      <p:transition>
         <p:fade/>
       </p:transition>
     </mc:Fallback>
@@ -10639,14 +12008,14 @@
   <p:clrMapOvr>
     <a:masterClrMapping/>
   </p:clrMapOvr>
-  <mc:AlternateContent xmlns:mc="http://schemas.openxmlformats.org/markup-compatibility/2006" xmlns:p14="http://schemas.microsoft.com/office/powerpoint/2010/main">
-    <mc:Choice Requires="p14">
-      <p:transition spd="slow" p14:dur="800">
-        <p14:flythrough/>
+  <mc:AlternateContent xmlns:mc="http://schemas.openxmlformats.org/markup-compatibility/2006">
+    <mc:Choice xmlns:p14="http://schemas.microsoft.com/office/powerpoint/2010/main" Requires="p14">
+      <p:transition p14:dur="400">
+        <p:fade/>
       </p:transition>
     </mc:Choice>
-    <mc:Fallback xmlns="">
-      <p:transition spd="slow">
+    <mc:Fallback>
+      <p:transition>
         <p:fade/>
       </p:transition>
     </mc:Fallback>
@@ -10837,14 +12206,14 @@
   <p:clrMapOvr>
     <a:masterClrMapping/>
   </p:clrMapOvr>
-  <mc:AlternateContent xmlns:mc="http://schemas.openxmlformats.org/markup-compatibility/2006" xmlns:p14="http://schemas.microsoft.com/office/powerpoint/2010/main">
-    <mc:Choice Requires="p14">
-      <p:transition spd="slow" p14:dur="800">
-        <p14:flythrough/>
+  <mc:AlternateContent xmlns:mc="http://schemas.openxmlformats.org/markup-compatibility/2006">
+    <mc:Choice xmlns:p14="http://schemas.microsoft.com/office/powerpoint/2010/main" Requires="p14">
+      <p:transition p14:dur="400">
+        <p:fade/>
       </p:transition>
     </mc:Choice>
-    <mc:Fallback xmlns="">
-      <p:transition spd="slow">
+    <mc:Fallback>
+      <p:transition>
         <p:fade/>
       </p:transition>
     </mc:Fallback>
@@ -11046,14 +12415,14 @@
   <p:clrMapOvr>
     <a:masterClrMapping/>
   </p:clrMapOvr>
-  <mc:AlternateContent xmlns:mc="http://schemas.openxmlformats.org/markup-compatibility/2006" xmlns:p14="http://schemas.microsoft.com/office/powerpoint/2010/main">
-    <mc:Choice Requires="p14">
-      <p:transition spd="slow" p14:dur="800">
-        <p14:flythrough/>
+  <mc:AlternateContent xmlns:mc="http://schemas.openxmlformats.org/markup-compatibility/2006">
+    <mc:Choice xmlns:p14="http://schemas.microsoft.com/office/powerpoint/2010/main" Requires="p14">
+      <p:transition p14:dur="400">
+        <p:fade/>
       </p:transition>
     </mc:Choice>
-    <mc:Fallback xmlns="">
-      <p:transition spd="slow">
+    <mc:Fallback>
+      <p:transition>
         <p:fade/>
       </p:transition>
     </mc:Fallback>
@@ -11192,14 +12561,14 @@
   <p:clrMapOvr>
     <a:masterClrMapping/>
   </p:clrMapOvr>
-  <mc:AlternateContent xmlns:mc="http://schemas.openxmlformats.org/markup-compatibility/2006" xmlns:p14="http://schemas.microsoft.com/office/powerpoint/2010/main">
-    <mc:Choice Requires="p14">
-      <p:transition spd="slow" p14:dur="800">
-        <p14:flythrough/>
+  <mc:AlternateContent xmlns:mc="http://schemas.openxmlformats.org/markup-compatibility/2006">
+    <mc:Choice xmlns:p14="http://schemas.microsoft.com/office/powerpoint/2010/main" Requires="p14">
+      <p:transition p14:dur="400">
+        <p:fade/>
       </p:transition>
     </mc:Choice>
-    <mc:Fallback xmlns="">
-      <p:transition spd="slow">
+    <mc:Fallback>
+      <p:transition>
         <p:fade/>
       </p:transition>
     </mc:Fallback>
@@ -11431,14 +12800,14 @@
   <p:clrMapOvr>
     <a:masterClrMapping/>
   </p:clrMapOvr>
-  <mc:AlternateContent xmlns:mc="http://schemas.openxmlformats.org/markup-compatibility/2006" xmlns:p14="http://schemas.microsoft.com/office/powerpoint/2010/main">
-    <mc:Choice Requires="p14">
-      <p:transition spd="slow" p14:dur="800">
-        <p14:flythrough/>
+  <mc:AlternateContent xmlns:mc="http://schemas.openxmlformats.org/markup-compatibility/2006">
+    <mc:Choice xmlns:p14="http://schemas.microsoft.com/office/powerpoint/2010/main" Requires="p14">
+      <p:transition p14:dur="400">
+        <p:fade/>
       </p:transition>
     </mc:Choice>
-    <mc:Fallback xmlns="">
-      <p:transition spd="slow">
+    <mc:Fallback>
+      <p:transition>
         <p:fade/>
       </p:transition>
     </mc:Fallback>

</xml_diff>